<commit_message>
URBAN BLOOM Project (1).pptx
</commit_message>
<xml_diff>
--- a/URBAN BLOOM Project (1).pptx
+++ b/URBAN BLOOM Project (1).pptx
@@ -14,10 +14,9 @@
     <p:sldId id="273" r:id="rId8"/>
     <p:sldId id="274" r:id="rId9"/>
     <p:sldId id="275" r:id="rId10"/>
-    <p:sldId id="263" r:id="rId11"/>
-    <p:sldId id="278" r:id="rId12"/>
-    <p:sldId id="277" r:id="rId13"/>
-    <p:sldId id="276" r:id="rId14"/>
+    <p:sldId id="278" r:id="rId11"/>
+    <p:sldId id="277" r:id="rId12"/>
+    <p:sldId id="276" r:id="rId13"/>
   </p:sldIdLst>
   <p:sldSz cx="12192000" cy="6858000"/>
   <p:notesSz cx="6858000" cy="9144000"/>
@@ -122,3369 +121,6 @@
     </p:ext>
   </p:extLst>
 </p:presentation>
-</file>
-
-<file path=ppt/diagrams/colors1.xml><?xml version="1.0" encoding="utf-8"?>
-<dgm:colorsDef xmlns:dgm="http://schemas.openxmlformats.org/drawingml/2006/diagram" xmlns:a="http://schemas.openxmlformats.org/drawingml/2006/main" uniqueId="urn:microsoft.com/office/officeart/2005/8/colors/colorful2">
-  <dgm:title val=""/>
-  <dgm:desc val=""/>
-  <dgm:catLst>
-    <dgm:cat type="colorful" pri="10200"/>
-  </dgm:catLst>
-  <dgm:styleLbl name="node0">
-    <dgm:fillClrLst meth="repeat">
-      <a:schemeClr val="accent1"/>
-    </dgm:fillClrLst>
-    <dgm:linClrLst meth="repeat">
-      <a:schemeClr val="lt1"/>
-    </dgm:linClrLst>
-    <dgm:effectClrLst/>
-    <dgm:txLinClrLst/>
-    <dgm:txFillClrLst/>
-    <dgm:txEffectClrLst/>
-  </dgm:styleLbl>
-  <dgm:styleLbl name="node1">
-    <dgm:fillClrLst>
-      <a:schemeClr val="accent2"/>
-      <a:schemeClr val="accent3"/>
-    </dgm:fillClrLst>
-    <dgm:linClrLst meth="repeat">
-      <a:schemeClr val="lt1"/>
-    </dgm:linClrLst>
-    <dgm:effectClrLst/>
-    <dgm:txLinClrLst/>
-    <dgm:txFillClrLst/>
-    <dgm:txEffectClrLst/>
-  </dgm:styleLbl>
-  <dgm:styleLbl name="alignNode1">
-    <dgm:fillClrLst>
-      <a:schemeClr val="accent2"/>
-      <a:schemeClr val="accent3"/>
-    </dgm:fillClrLst>
-    <dgm:linClrLst>
-      <a:schemeClr val="accent2"/>
-      <a:schemeClr val="accent3"/>
-    </dgm:linClrLst>
-    <dgm:effectClrLst/>
-    <dgm:txLinClrLst/>
-    <dgm:txFillClrLst/>
-    <dgm:txEffectClrLst/>
-  </dgm:styleLbl>
-  <dgm:styleLbl name="lnNode1">
-    <dgm:fillClrLst>
-      <a:schemeClr val="accent2"/>
-      <a:schemeClr val="accent3"/>
-    </dgm:fillClrLst>
-    <dgm:linClrLst meth="repeat">
-      <a:schemeClr val="lt1"/>
-    </dgm:linClrLst>
-    <dgm:effectClrLst/>
-    <dgm:txLinClrLst/>
-    <dgm:txFillClrLst/>
-    <dgm:txEffectClrLst/>
-  </dgm:styleLbl>
-  <dgm:styleLbl name="vennNode1">
-    <dgm:fillClrLst>
-      <a:schemeClr val="accent2">
-        <a:alpha val="50000"/>
-      </a:schemeClr>
-      <a:schemeClr val="accent3">
-        <a:alpha val="50000"/>
-      </a:schemeClr>
-    </dgm:fillClrLst>
-    <dgm:linClrLst meth="repeat">
-      <a:schemeClr val="lt1"/>
-    </dgm:linClrLst>
-    <dgm:effectClrLst/>
-    <dgm:txLinClrLst/>
-    <dgm:txFillClrLst/>
-    <dgm:txEffectClrLst/>
-  </dgm:styleLbl>
-  <dgm:styleLbl name="node2">
-    <dgm:fillClrLst>
-      <a:schemeClr val="accent3"/>
-    </dgm:fillClrLst>
-    <dgm:linClrLst meth="repeat">
-      <a:schemeClr val="lt1"/>
-    </dgm:linClrLst>
-    <dgm:effectClrLst/>
-    <dgm:txLinClrLst/>
-    <dgm:txFillClrLst/>
-    <dgm:txEffectClrLst/>
-  </dgm:styleLbl>
-  <dgm:styleLbl name="node3">
-    <dgm:fillClrLst>
-      <a:schemeClr val="accent4"/>
-    </dgm:fillClrLst>
-    <dgm:linClrLst meth="repeat">
-      <a:schemeClr val="lt1"/>
-    </dgm:linClrLst>
-    <dgm:effectClrLst/>
-    <dgm:txLinClrLst/>
-    <dgm:txFillClrLst/>
-    <dgm:txEffectClrLst/>
-  </dgm:styleLbl>
-  <dgm:styleLbl name="node4">
-    <dgm:fillClrLst>
-      <a:schemeClr val="accent5"/>
-    </dgm:fillClrLst>
-    <dgm:linClrLst meth="repeat">
-      <a:schemeClr val="lt1"/>
-    </dgm:linClrLst>
-    <dgm:effectClrLst/>
-    <dgm:txLinClrLst/>
-    <dgm:txFillClrLst/>
-    <dgm:txEffectClrLst/>
-  </dgm:styleLbl>
-  <dgm:styleLbl name="fgImgPlace1">
-    <dgm:fillClrLst>
-      <a:schemeClr val="accent2">
-        <a:tint val="50000"/>
-      </a:schemeClr>
-      <a:schemeClr val="accent3">
-        <a:tint val="50000"/>
-      </a:schemeClr>
-    </dgm:fillClrLst>
-    <dgm:linClrLst meth="repeat">
-      <a:schemeClr val="lt1"/>
-    </dgm:linClrLst>
-    <dgm:effectClrLst/>
-    <dgm:txLinClrLst/>
-    <dgm:txFillClrLst meth="repeat">
-      <a:schemeClr val="lt1"/>
-    </dgm:txFillClrLst>
-    <dgm:txEffectClrLst/>
-  </dgm:styleLbl>
-  <dgm:styleLbl name="alignImgPlace1">
-    <dgm:fillClrLst>
-      <a:schemeClr val="accent2">
-        <a:tint val="50000"/>
-      </a:schemeClr>
-      <a:schemeClr val="accent3">
-        <a:tint val="20000"/>
-      </a:schemeClr>
-    </dgm:fillClrLst>
-    <dgm:linClrLst meth="repeat">
-      <a:schemeClr val="lt1"/>
-    </dgm:linClrLst>
-    <dgm:effectClrLst/>
-    <dgm:txLinClrLst/>
-    <dgm:txFillClrLst meth="repeat">
-      <a:schemeClr val="lt1"/>
-    </dgm:txFillClrLst>
-    <dgm:txEffectClrLst/>
-  </dgm:styleLbl>
-  <dgm:styleLbl name="bgImgPlace1">
-    <dgm:fillClrLst>
-      <a:schemeClr val="accent2">
-        <a:tint val="50000"/>
-      </a:schemeClr>
-      <a:schemeClr val="accent3">
-        <a:tint val="20000"/>
-      </a:schemeClr>
-    </dgm:fillClrLst>
-    <dgm:linClrLst meth="repeat">
-      <a:schemeClr val="lt1"/>
-    </dgm:linClrLst>
-    <dgm:effectClrLst/>
-    <dgm:txLinClrLst/>
-    <dgm:txFillClrLst meth="repeat">
-      <a:schemeClr val="lt1"/>
-    </dgm:txFillClrLst>
-    <dgm:txEffectClrLst/>
-  </dgm:styleLbl>
-  <dgm:styleLbl name="sibTrans2D1">
-    <dgm:fillClrLst>
-      <a:schemeClr val="accent2"/>
-      <a:schemeClr val="accent3"/>
-    </dgm:fillClrLst>
-    <dgm:linClrLst meth="repeat">
-      <a:schemeClr val="lt1"/>
-    </dgm:linClrLst>
-    <dgm:effectClrLst/>
-    <dgm:txLinClrLst/>
-    <dgm:txFillClrLst/>
-    <dgm:txEffectClrLst/>
-  </dgm:styleLbl>
-  <dgm:styleLbl name="fgSibTrans2D1">
-    <dgm:fillClrLst>
-      <a:schemeClr val="accent2"/>
-      <a:schemeClr val="accent3"/>
-    </dgm:fillClrLst>
-    <dgm:linClrLst meth="repeat">
-      <a:schemeClr val="lt1"/>
-    </dgm:linClrLst>
-    <dgm:effectClrLst/>
-    <dgm:txLinClrLst/>
-    <dgm:txFillClrLst meth="repeat">
-      <a:schemeClr val="lt1"/>
-    </dgm:txFillClrLst>
-    <dgm:txEffectClrLst/>
-  </dgm:styleLbl>
-  <dgm:styleLbl name="bgSibTrans2D1">
-    <dgm:fillClrLst>
-      <a:schemeClr val="accent2"/>
-      <a:schemeClr val="accent3"/>
-    </dgm:fillClrLst>
-    <dgm:linClrLst meth="repeat">
-      <a:schemeClr val="lt1"/>
-    </dgm:linClrLst>
-    <dgm:effectClrLst/>
-    <dgm:txLinClrLst/>
-    <dgm:txFillClrLst meth="repeat">
-      <a:schemeClr val="lt1"/>
-    </dgm:txFillClrLst>
-    <dgm:txEffectClrLst/>
-  </dgm:styleLbl>
-  <dgm:styleLbl name="sibTrans1D1">
-    <dgm:fillClrLst/>
-    <dgm:linClrLst>
-      <a:schemeClr val="accent2"/>
-      <a:schemeClr val="accent3"/>
-    </dgm:linClrLst>
-    <dgm:effectClrLst/>
-    <dgm:txLinClrLst/>
-    <dgm:txFillClrLst meth="repeat">
-      <a:schemeClr val="tx1"/>
-    </dgm:txFillClrLst>
-    <dgm:txEffectClrLst/>
-  </dgm:styleLbl>
-  <dgm:styleLbl name="callout">
-    <dgm:fillClrLst meth="repeat">
-      <a:schemeClr val="accent2"/>
-    </dgm:fillClrLst>
-    <dgm:linClrLst meth="repeat">
-      <a:schemeClr val="accent2">
-        <a:tint val="50000"/>
-      </a:schemeClr>
-    </dgm:linClrLst>
-    <dgm:effectClrLst/>
-    <dgm:txLinClrLst/>
-    <dgm:txFillClrLst meth="repeat">
-      <a:schemeClr val="tx1"/>
-    </dgm:txFillClrLst>
-    <dgm:txEffectClrLst/>
-  </dgm:styleLbl>
-  <dgm:styleLbl name="asst0">
-    <dgm:fillClrLst meth="repeat">
-      <a:schemeClr val="accent2"/>
-    </dgm:fillClrLst>
-    <dgm:linClrLst meth="repeat">
-      <a:schemeClr val="lt1">
-        <a:shade val="80000"/>
-      </a:schemeClr>
-    </dgm:linClrLst>
-    <dgm:effectClrLst/>
-    <dgm:txLinClrLst/>
-    <dgm:txFillClrLst/>
-    <dgm:txEffectClrLst/>
-  </dgm:styleLbl>
-  <dgm:styleLbl name="asst1">
-    <dgm:fillClrLst meth="repeat">
-      <a:schemeClr val="accent3"/>
-    </dgm:fillClrLst>
-    <dgm:linClrLst meth="repeat">
-      <a:schemeClr val="lt1">
-        <a:shade val="80000"/>
-      </a:schemeClr>
-    </dgm:linClrLst>
-    <dgm:effectClrLst/>
-    <dgm:txLinClrLst/>
-    <dgm:txFillClrLst/>
-    <dgm:txEffectClrLst/>
-  </dgm:styleLbl>
-  <dgm:styleLbl name="asst2">
-    <dgm:fillClrLst>
-      <a:schemeClr val="accent4"/>
-    </dgm:fillClrLst>
-    <dgm:linClrLst meth="repeat">
-      <a:schemeClr val="lt1"/>
-    </dgm:linClrLst>
-    <dgm:effectClrLst/>
-    <dgm:txLinClrLst/>
-    <dgm:txFillClrLst/>
-    <dgm:txEffectClrLst/>
-  </dgm:styleLbl>
-  <dgm:styleLbl name="asst3">
-    <dgm:fillClrLst>
-      <a:schemeClr val="accent5"/>
-    </dgm:fillClrLst>
-    <dgm:linClrLst meth="repeat">
-      <a:schemeClr val="lt1"/>
-    </dgm:linClrLst>
-    <dgm:effectClrLst/>
-    <dgm:txLinClrLst/>
-    <dgm:txFillClrLst/>
-    <dgm:txEffectClrLst/>
-  </dgm:styleLbl>
-  <dgm:styleLbl name="asst4">
-    <dgm:fillClrLst>
-      <a:schemeClr val="accent6"/>
-    </dgm:fillClrLst>
-    <dgm:linClrLst meth="repeat">
-      <a:schemeClr val="lt1"/>
-    </dgm:linClrLst>
-    <dgm:effectClrLst/>
-    <dgm:txLinClrLst/>
-    <dgm:txFillClrLst/>
-    <dgm:txEffectClrLst/>
-  </dgm:styleLbl>
-  <dgm:styleLbl name="parChTrans2D1">
-    <dgm:fillClrLst meth="repeat">
-      <a:schemeClr val="accent2"/>
-    </dgm:fillClrLst>
-    <dgm:linClrLst meth="repeat">
-      <a:schemeClr val="lt1"/>
-    </dgm:linClrLst>
-    <dgm:effectClrLst/>
-    <dgm:txLinClrLst/>
-    <dgm:txFillClrLst meth="repeat">
-      <a:schemeClr val="lt1"/>
-    </dgm:txFillClrLst>
-    <dgm:txEffectClrLst/>
-  </dgm:styleLbl>
-  <dgm:styleLbl name="parChTrans2D2">
-    <dgm:fillClrLst meth="repeat">
-      <a:schemeClr val="accent3"/>
-    </dgm:fillClrLst>
-    <dgm:linClrLst meth="repeat">
-      <a:schemeClr val="lt1"/>
-    </dgm:linClrLst>
-    <dgm:effectClrLst/>
-    <dgm:txLinClrLst/>
-    <dgm:txFillClrLst/>
-    <dgm:txEffectClrLst/>
-  </dgm:styleLbl>
-  <dgm:styleLbl name="parChTrans2D3">
-    <dgm:fillClrLst meth="repeat">
-      <a:schemeClr val="accent4"/>
-    </dgm:fillClrLst>
-    <dgm:linClrLst meth="repeat">
-      <a:schemeClr val="lt1"/>
-    </dgm:linClrLst>
-    <dgm:effectClrLst/>
-    <dgm:txLinClrLst/>
-    <dgm:txFillClrLst/>
-    <dgm:txEffectClrLst/>
-  </dgm:styleLbl>
-  <dgm:styleLbl name="parChTrans2D4">
-    <dgm:fillClrLst meth="repeat">
-      <a:schemeClr val="accent5"/>
-    </dgm:fillClrLst>
-    <dgm:linClrLst meth="repeat">
-      <a:schemeClr val="lt1"/>
-    </dgm:linClrLst>
-    <dgm:effectClrLst/>
-    <dgm:txLinClrLst/>
-    <dgm:txFillClrLst meth="repeat">
-      <a:schemeClr val="lt1"/>
-    </dgm:txFillClrLst>
-    <dgm:txEffectClrLst/>
-  </dgm:styleLbl>
-  <dgm:styleLbl name="parChTrans1D1">
-    <dgm:fillClrLst meth="repeat">
-      <a:schemeClr val="accent2"/>
-    </dgm:fillClrLst>
-    <dgm:linClrLst meth="repeat">
-      <a:schemeClr val="accent2"/>
-    </dgm:linClrLst>
-    <dgm:effectClrLst/>
-    <dgm:txLinClrLst/>
-    <dgm:txFillClrLst meth="repeat">
-      <a:schemeClr val="tx1"/>
-    </dgm:txFillClrLst>
-    <dgm:txEffectClrLst/>
-  </dgm:styleLbl>
-  <dgm:styleLbl name="parChTrans1D2">
-    <dgm:fillClrLst meth="repeat">
-      <a:schemeClr val="accent2">
-        <a:tint val="90000"/>
-      </a:schemeClr>
-    </dgm:fillClrLst>
-    <dgm:linClrLst meth="repeat">
-      <a:schemeClr val="accent3"/>
-    </dgm:linClrLst>
-    <dgm:effectClrLst/>
-    <dgm:txLinClrLst/>
-    <dgm:txFillClrLst meth="repeat">
-      <a:schemeClr val="tx1"/>
-    </dgm:txFillClrLst>
-    <dgm:txEffectClrLst/>
-  </dgm:styleLbl>
-  <dgm:styleLbl name="parChTrans1D3">
-    <dgm:fillClrLst meth="repeat">
-      <a:schemeClr val="accent2">
-        <a:tint val="70000"/>
-      </a:schemeClr>
-    </dgm:fillClrLst>
-    <dgm:linClrLst meth="repeat">
-      <a:schemeClr val="accent4"/>
-    </dgm:linClrLst>
-    <dgm:effectClrLst/>
-    <dgm:txLinClrLst/>
-    <dgm:txFillClrLst meth="repeat">
-      <a:schemeClr val="tx1"/>
-    </dgm:txFillClrLst>
-    <dgm:txEffectClrLst/>
-  </dgm:styleLbl>
-  <dgm:styleLbl name="parChTrans1D4">
-    <dgm:fillClrLst meth="repeat">
-      <a:schemeClr val="accent2">
-        <a:tint val="50000"/>
-      </a:schemeClr>
-    </dgm:fillClrLst>
-    <dgm:linClrLst meth="repeat">
-      <a:schemeClr val="accent5"/>
-    </dgm:linClrLst>
-    <dgm:effectClrLst/>
-    <dgm:txLinClrLst/>
-    <dgm:txFillClrLst meth="repeat">
-      <a:schemeClr val="tx1"/>
-    </dgm:txFillClrLst>
-    <dgm:txEffectClrLst/>
-  </dgm:styleLbl>
-  <dgm:styleLbl name="fgAcc1">
-    <dgm:fillClrLst meth="repeat">
-      <a:schemeClr val="lt1">
-        <a:alpha val="90000"/>
-      </a:schemeClr>
-    </dgm:fillClrLst>
-    <dgm:linClrLst>
-      <a:schemeClr val="accent2"/>
-      <a:schemeClr val="accent3"/>
-    </dgm:linClrLst>
-    <dgm:effectClrLst/>
-    <dgm:txLinClrLst/>
-    <dgm:txFillClrLst meth="repeat">
-      <a:schemeClr val="dk1"/>
-    </dgm:txFillClrLst>
-    <dgm:txEffectClrLst/>
-  </dgm:styleLbl>
-  <dgm:styleLbl name="conFgAcc1">
-    <dgm:fillClrLst meth="repeat">
-      <a:schemeClr val="lt1">
-        <a:alpha val="90000"/>
-      </a:schemeClr>
-    </dgm:fillClrLst>
-    <dgm:linClrLst>
-      <a:schemeClr val="accent2"/>
-      <a:schemeClr val="accent3"/>
-    </dgm:linClrLst>
-    <dgm:effectClrLst/>
-    <dgm:txLinClrLst/>
-    <dgm:txFillClrLst meth="repeat">
-      <a:schemeClr val="dk1"/>
-    </dgm:txFillClrLst>
-    <dgm:txEffectClrLst/>
-  </dgm:styleLbl>
-  <dgm:styleLbl name="alignAcc1">
-    <dgm:fillClrLst meth="repeat">
-      <a:schemeClr val="lt1">
-        <a:alpha val="90000"/>
-      </a:schemeClr>
-    </dgm:fillClrLst>
-    <dgm:linClrLst>
-      <a:schemeClr val="accent2"/>
-      <a:schemeClr val="accent3"/>
-    </dgm:linClrLst>
-    <dgm:effectClrLst/>
-    <dgm:txLinClrLst/>
-    <dgm:txFillClrLst meth="repeat">
-      <a:schemeClr val="dk1"/>
-    </dgm:txFillClrLst>
-    <dgm:txEffectClrLst/>
-  </dgm:styleLbl>
-  <dgm:styleLbl name="trAlignAcc1">
-    <dgm:fillClrLst meth="repeat">
-      <a:schemeClr val="lt1">
-        <a:alpha val="40000"/>
-      </a:schemeClr>
-    </dgm:fillClrLst>
-    <dgm:linClrLst meth="repeat">
-      <a:schemeClr val="accent2"/>
-    </dgm:linClrLst>
-    <dgm:effectClrLst/>
-    <dgm:txLinClrLst/>
-    <dgm:txFillClrLst meth="repeat">
-      <a:schemeClr val="dk1"/>
-    </dgm:txFillClrLst>
-    <dgm:txEffectClrLst/>
-  </dgm:styleLbl>
-  <dgm:styleLbl name="bgAcc1">
-    <dgm:fillClrLst meth="repeat">
-      <a:schemeClr val="lt1">
-        <a:alpha val="90000"/>
-      </a:schemeClr>
-    </dgm:fillClrLst>
-    <dgm:linClrLst>
-      <a:schemeClr val="accent2"/>
-      <a:schemeClr val="accent3"/>
-    </dgm:linClrLst>
-    <dgm:effectClrLst/>
-    <dgm:txLinClrLst/>
-    <dgm:txFillClrLst meth="repeat">
-      <a:schemeClr val="dk1"/>
-    </dgm:txFillClrLst>
-    <dgm:txEffectClrLst/>
-  </dgm:styleLbl>
-  <dgm:styleLbl name="solidFgAcc1">
-    <dgm:fillClrLst meth="repeat">
-      <a:schemeClr val="lt1"/>
-    </dgm:fillClrLst>
-    <dgm:linClrLst>
-      <a:schemeClr val="accent2"/>
-      <a:schemeClr val="accent3"/>
-    </dgm:linClrLst>
-    <dgm:effectClrLst/>
-    <dgm:txLinClrLst/>
-    <dgm:txFillClrLst meth="repeat">
-      <a:schemeClr val="dk1"/>
-    </dgm:txFillClrLst>
-    <dgm:txEffectClrLst/>
-  </dgm:styleLbl>
-  <dgm:styleLbl name="solidAlignAcc1">
-    <dgm:fillClrLst meth="repeat">
-      <a:schemeClr val="lt1"/>
-    </dgm:fillClrLst>
-    <dgm:linClrLst>
-      <a:schemeClr val="accent2"/>
-      <a:schemeClr val="accent3"/>
-    </dgm:linClrLst>
-    <dgm:effectClrLst/>
-    <dgm:txLinClrLst/>
-    <dgm:txFillClrLst meth="repeat">
-      <a:schemeClr val="dk1"/>
-    </dgm:txFillClrLst>
-    <dgm:txEffectClrLst/>
-  </dgm:styleLbl>
-  <dgm:styleLbl name="solidBgAcc1">
-    <dgm:fillClrLst meth="repeat">
-      <a:schemeClr val="lt1"/>
-    </dgm:fillClrLst>
-    <dgm:linClrLst>
-      <a:schemeClr val="accent2"/>
-      <a:schemeClr val="accent3"/>
-    </dgm:linClrLst>
-    <dgm:effectClrLst/>
-    <dgm:txLinClrLst/>
-    <dgm:txFillClrLst meth="repeat">
-      <a:schemeClr val="dk1"/>
-    </dgm:txFillClrLst>
-    <dgm:txEffectClrLst/>
-  </dgm:styleLbl>
-  <dgm:styleLbl name="fgAccFollowNode1">
-    <dgm:fillClrLst>
-      <a:schemeClr val="accent2">
-        <a:tint val="40000"/>
-        <a:alpha val="90000"/>
-      </a:schemeClr>
-      <a:schemeClr val="accent3">
-        <a:tint val="40000"/>
-        <a:alpha val="90000"/>
-      </a:schemeClr>
-    </dgm:fillClrLst>
-    <dgm:linClrLst>
-      <a:schemeClr val="accent2">
-        <a:tint val="40000"/>
-        <a:alpha val="90000"/>
-      </a:schemeClr>
-      <a:schemeClr val="accent3">
-        <a:tint val="40000"/>
-        <a:alpha val="90000"/>
-      </a:schemeClr>
-    </dgm:linClrLst>
-    <dgm:effectClrLst/>
-    <dgm:txLinClrLst/>
-    <dgm:txFillClrLst meth="repeat">
-      <a:schemeClr val="dk1"/>
-    </dgm:txFillClrLst>
-    <dgm:txEffectClrLst/>
-  </dgm:styleLbl>
-  <dgm:styleLbl name="alignAccFollowNode1">
-    <dgm:fillClrLst>
-      <a:schemeClr val="accent2">
-        <a:tint val="40000"/>
-        <a:alpha val="90000"/>
-      </a:schemeClr>
-      <a:schemeClr val="accent3">
-        <a:tint val="40000"/>
-        <a:alpha val="90000"/>
-      </a:schemeClr>
-    </dgm:fillClrLst>
-    <dgm:linClrLst>
-      <a:schemeClr val="accent2">
-        <a:tint val="40000"/>
-        <a:alpha val="90000"/>
-      </a:schemeClr>
-      <a:schemeClr val="accent3">
-        <a:tint val="40000"/>
-        <a:alpha val="90000"/>
-      </a:schemeClr>
-    </dgm:linClrLst>
-    <dgm:effectClrLst/>
-    <dgm:txLinClrLst/>
-    <dgm:txFillClrLst meth="repeat">
-      <a:schemeClr val="dk1"/>
-    </dgm:txFillClrLst>
-    <dgm:txEffectClrLst/>
-  </dgm:styleLbl>
-  <dgm:styleLbl name="bgAccFollowNode1">
-    <dgm:fillClrLst>
-      <a:schemeClr val="accent2">
-        <a:tint val="40000"/>
-        <a:alpha val="90000"/>
-      </a:schemeClr>
-      <a:schemeClr val="accent3">
-        <a:tint val="40000"/>
-        <a:alpha val="90000"/>
-      </a:schemeClr>
-    </dgm:fillClrLst>
-    <dgm:linClrLst>
-      <a:schemeClr val="accent2">
-        <a:tint val="40000"/>
-        <a:alpha val="90000"/>
-      </a:schemeClr>
-      <a:schemeClr val="accent3">
-        <a:tint val="40000"/>
-        <a:alpha val="90000"/>
-      </a:schemeClr>
-    </dgm:linClrLst>
-    <dgm:effectClrLst/>
-    <dgm:txLinClrLst/>
-    <dgm:txFillClrLst meth="repeat">
-      <a:schemeClr val="dk1"/>
-    </dgm:txFillClrLst>
-    <dgm:txEffectClrLst/>
-  </dgm:styleLbl>
-  <dgm:styleLbl name="fgAcc0">
-    <dgm:fillClrLst meth="repeat">
-      <a:schemeClr val="lt1">
-        <a:alpha val="90000"/>
-      </a:schemeClr>
-    </dgm:fillClrLst>
-    <dgm:linClrLst>
-      <a:schemeClr val="accent1"/>
-    </dgm:linClrLst>
-    <dgm:effectClrLst/>
-    <dgm:txLinClrLst/>
-    <dgm:txFillClrLst meth="repeat">
-      <a:schemeClr val="dk1"/>
-    </dgm:txFillClrLst>
-    <dgm:txEffectClrLst/>
-  </dgm:styleLbl>
-  <dgm:styleLbl name="fgAcc2">
-    <dgm:fillClrLst meth="repeat">
-      <a:schemeClr val="lt1">
-        <a:alpha val="90000"/>
-      </a:schemeClr>
-    </dgm:fillClrLst>
-    <dgm:linClrLst>
-      <a:schemeClr val="accent3"/>
-    </dgm:linClrLst>
-    <dgm:effectClrLst/>
-    <dgm:txLinClrLst/>
-    <dgm:txFillClrLst meth="repeat">
-      <a:schemeClr val="dk1"/>
-    </dgm:txFillClrLst>
-    <dgm:txEffectClrLst/>
-  </dgm:styleLbl>
-  <dgm:styleLbl name="fgAcc3">
-    <dgm:fillClrLst meth="repeat">
-      <a:schemeClr val="lt1">
-        <a:alpha val="90000"/>
-      </a:schemeClr>
-    </dgm:fillClrLst>
-    <dgm:linClrLst>
-      <a:schemeClr val="accent4"/>
-    </dgm:linClrLst>
-    <dgm:effectClrLst/>
-    <dgm:txLinClrLst/>
-    <dgm:txFillClrLst meth="repeat">
-      <a:schemeClr val="dk1"/>
-    </dgm:txFillClrLst>
-    <dgm:txEffectClrLst/>
-  </dgm:styleLbl>
-  <dgm:styleLbl name="fgAcc4">
-    <dgm:fillClrLst meth="repeat">
-      <a:schemeClr val="lt1">
-        <a:alpha val="90000"/>
-      </a:schemeClr>
-    </dgm:fillClrLst>
-    <dgm:linClrLst>
-      <a:schemeClr val="accent5"/>
-    </dgm:linClrLst>
-    <dgm:effectClrLst/>
-    <dgm:txLinClrLst/>
-    <dgm:txFillClrLst meth="repeat">
-      <a:schemeClr val="dk1"/>
-    </dgm:txFillClrLst>
-    <dgm:txEffectClrLst/>
-  </dgm:styleLbl>
-  <dgm:styleLbl name="bgShp">
-    <dgm:fillClrLst meth="repeat">
-      <a:schemeClr val="accent2">
-        <a:tint val="40000"/>
-      </a:schemeClr>
-    </dgm:fillClrLst>
-    <dgm:linClrLst meth="repeat">
-      <a:schemeClr val="dk1"/>
-    </dgm:linClrLst>
-    <dgm:effectClrLst/>
-    <dgm:txLinClrLst/>
-    <dgm:txFillClrLst meth="repeat">
-      <a:schemeClr val="dk1"/>
-    </dgm:txFillClrLst>
-    <dgm:txEffectClrLst/>
-  </dgm:styleLbl>
-  <dgm:styleLbl name="dkBgShp">
-    <dgm:fillClrLst meth="repeat">
-      <a:schemeClr val="accent2">
-        <a:shade val="90000"/>
-      </a:schemeClr>
-    </dgm:fillClrLst>
-    <dgm:linClrLst meth="repeat">
-      <a:schemeClr val="dk1"/>
-    </dgm:linClrLst>
-    <dgm:effectClrLst/>
-    <dgm:txLinClrLst/>
-    <dgm:txFillClrLst meth="repeat">
-      <a:schemeClr val="lt1"/>
-    </dgm:txFillClrLst>
-    <dgm:txEffectClrLst/>
-  </dgm:styleLbl>
-  <dgm:styleLbl name="trBgShp">
-    <dgm:fillClrLst meth="repeat">
-      <a:schemeClr val="accent2">
-        <a:tint val="50000"/>
-        <a:alpha val="40000"/>
-      </a:schemeClr>
-    </dgm:fillClrLst>
-    <dgm:linClrLst meth="repeat">
-      <a:schemeClr val="accent2"/>
-    </dgm:linClrLst>
-    <dgm:effectClrLst/>
-    <dgm:txLinClrLst/>
-    <dgm:txFillClrLst meth="repeat">
-      <a:schemeClr val="lt1"/>
-    </dgm:txFillClrLst>
-    <dgm:txEffectClrLst/>
-  </dgm:styleLbl>
-  <dgm:styleLbl name="fgShp">
-    <dgm:fillClrLst meth="repeat">
-      <a:schemeClr val="accent2">
-        <a:tint val="40000"/>
-      </a:schemeClr>
-    </dgm:fillClrLst>
-    <dgm:linClrLst meth="repeat">
-      <a:schemeClr val="lt1"/>
-    </dgm:linClrLst>
-    <dgm:effectClrLst/>
-    <dgm:txLinClrLst/>
-    <dgm:txFillClrLst meth="repeat">
-      <a:schemeClr val="dk1"/>
-    </dgm:txFillClrLst>
-    <dgm:txEffectClrLst/>
-  </dgm:styleLbl>
-  <dgm:styleLbl name="revTx">
-    <dgm:fillClrLst meth="repeat">
-      <a:schemeClr val="lt1">
-        <a:alpha val="0"/>
-      </a:schemeClr>
-    </dgm:fillClrLst>
-    <dgm:linClrLst meth="repeat">
-      <a:schemeClr val="dk1">
-        <a:alpha val="0"/>
-      </a:schemeClr>
-    </dgm:linClrLst>
-    <dgm:effectClrLst/>
-    <dgm:txLinClrLst/>
-    <dgm:txFillClrLst meth="repeat">
-      <a:schemeClr val="tx1"/>
-    </dgm:txFillClrLst>
-    <dgm:txEffectClrLst/>
-  </dgm:styleLbl>
-</dgm:colorsDef>
-</file>
-
-<file path=ppt/diagrams/data1.xml><?xml version="1.0" encoding="utf-8"?>
-<dgm:dataModel xmlns:dgm="http://schemas.openxmlformats.org/drawingml/2006/diagram" xmlns:a="http://schemas.openxmlformats.org/drawingml/2006/main">
-  <dgm:ptLst>
-    <dgm:pt modelId="{64C74917-18CF-405D-860E-D0C3A684B7ED}" type="doc">
-      <dgm:prSet loTypeId="urn:microsoft.com/office/officeart/2008/layout/LinedList" loCatId="list" qsTypeId="urn:microsoft.com/office/officeart/2005/8/quickstyle/simple4" qsCatId="simple" csTypeId="urn:microsoft.com/office/officeart/2005/8/colors/colorful2" csCatId="colorful"/>
-      <dgm:spPr/>
-      <dgm:t>
-        <a:bodyPr/>
-        <a:lstStyle/>
-        <a:p>
-          <a:endParaRPr lang="en-US"/>
-        </a:p>
-      </dgm:t>
-    </dgm:pt>
-    <dgm:pt modelId="{C1D6BF9C-147A-4A18-A4AC-BFA1A3617070}">
-      <dgm:prSet/>
-      <dgm:spPr/>
-      <dgm:t>
-        <a:bodyPr/>
-        <a:lstStyle/>
-        <a:p>
-          <a:r>
-            <a:rPr lang="en-US" dirty="0"/>
-            <a:t>Security is a top priority in </a:t>
-          </a:r>
-          <a:r>
-            <a:rPr lang="en-US" dirty="0" err="1"/>
-            <a:t>UrbanBloom</a:t>
-          </a:r>
-          <a:r>
-            <a:rPr lang="en-US" dirty="0"/>
-            <a:t>, with features including </a:t>
-          </a:r>
-        </a:p>
-      </dgm:t>
-    </dgm:pt>
-    <dgm:pt modelId="{CEA9992C-AEA8-4C03-B4D2-AE5FE8B2A934}" type="parTrans" cxnId="{836E754E-98C6-4C68-9A1F-8B4F8EBCFE1F}">
-      <dgm:prSet/>
-      <dgm:spPr/>
-      <dgm:t>
-        <a:bodyPr/>
-        <a:lstStyle/>
-        <a:p>
-          <a:endParaRPr lang="en-US"/>
-        </a:p>
-      </dgm:t>
-    </dgm:pt>
-    <dgm:pt modelId="{00465AEA-468A-4316-B87D-70D0DC9DB9EB}" type="sibTrans" cxnId="{836E754E-98C6-4C68-9A1F-8B4F8EBCFE1F}">
-      <dgm:prSet/>
-      <dgm:spPr/>
-      <dgm:t>
-        <a:bodyPr/>
-        <a:lstStyle/>
-        <a:p>
-          <a:endParaRPr lang="en-US"/>
-        </a:p>
-      </dgm:t>
-    </dgm:pt>
-    <dgm:pt modelId="{BBCCD19C-55F1-489E-8D4E-F047EC65CC32}">
-      <dgm:prSet/>
-      <dgm:spPr/>
-      <dgm:t>
-        <a:bodyPr/>
-        <a:lstStyle/>
-        <a:p>
-          <a:r>
-            <a:rPr lang="en-US" dirty="0"/>
-            <a:t>JWT Authentication: Tokens are used for secure login.</a:t>
-          </a:r>
-        </a:p>
-      </dgm:t>
-    </dgm:pt>
-    <dgm:pt modelId="{7DFCBDDF-39FD-4357-A1B3-41928A9BF26B}" type="parTrans" cxnId="{D1D98BB4-F0CA-4A85-95A7-A0C0E13B6EFC}">
-      <dgm:prSet/>
-      <dgm:spPr/>
-      <dgm:t>
-        <a:bodyPr/>
-        <a:lstStyle/>
-        <a:p>
-          <a:endParaRPr lang="en-US"/>
-        </a:p>
-      </dgm:t>
-    </dgm:pt>
-    <dgm:pt modelId="{7A638918-9FBD-4B5D-9B7F-52D91F61D1E8}" type="sibTrans" cxnId="{D1D98BB4-F0CA-4A85-95A7-A0C0E13B6EFC}">
-      <dgm:prSet/>
-      <dgm:spPr/>
-      <dgm:t>
-        <a:bodyPr/>
-        <a:lstStyle/>
-        <a:p>
-          <a:endParaRPr lang="en-US"/>
-        </a:p>
-      </dgm:t>
-    </dgm:pt>
-    <dgm:pt modelId="{2C657FEA-C5C9-457B-85D2-DAEB05F2C7F6}">
-      <dgm:prSet/>
-      <dgm:spPr/>
-      <dgm:t>
-        <a:bodyPr/>
-        <a:lstStyle/>
-        <a:p>
-          <a:r>
-            <a:rPr lang="en-US" dirty="0"/>
-            <a:t>Role-Based Access Control: Ensures access to only permitted resources.</a:t>
-          </a:r>
-        </a:p>
-      </dgm:t>
-    </dgm:pt>
-    <dgm:pt modelId="{B93A0425-18A0-400E-8A92-85A8E58271D4}" type="parTrans" cxnId="{16A358E3-3F32-4665-B98F-E133D21A1D00}">
-      <dgm:prSet/>
-      <dgm:spPr/>
-      <dgm:t>
-        <a:bodyPr/>
-        <a:lstStyle/>
-        <a:p>
-          <a:endParaRPr lang="en-US"/>
-        </a:p>
-      </dgm:t>
-    </dgm:pt>
-    <dgm:pt modelId="{A57E44DD-630B-4169-91A2-B2A2A8242FDE}" type="sibTrans" cxnId="{16A358E3-3F32-4665-B98F-E133D21A1D00}">
-      <dgm:prSet/>
-      <dgm:spPr/>
-      <dgm:t>
-        <a:bodyPr/>
-        <a:lstStyle/>
-        <a:p>
-          <a:endParaRPr lang="en-US"/>
-        </a:p>
-      </dgm:t>
-    </dgm:pt>
-    <dgm:pt modelId="{B9D2CEBE-E2C3-4877-ADE3-E7D5585C9CEA}">
-      <dgm:prSet/>
-      <dgm:spPr/>
-      <dgm:t>
-        <a:bodyPr/>
-        <a:lstStyle/>
-        <a:p>
-          <a:r>
-            <a:rPr lang="en-US"/>
-            <a:t>Data Encryption: Encrypts sensitive data in transit and at rest.</a:t>
-          </a:r>
-        </a:p>
-      </dgm:t>
-    </dgm:pt>
-    <dgm:pt modelId="{CA36C7D7-AC61-436D-85B6-913CD437CAA6}" type="parTrans" cxnId="{DF64292E-B5F9-4D53-BEE2-54048AA669F4}">
-      <dgm:prSet/>
-      <dgm:spPr/>
-      <dgm:t>
-        <a:bodyPr/>
-        <a:lstStyle/>
-        <a:p>
-          <a:endParaRPr lang="en-US"/>
-        </a:p>
-      </dgm:t>
-    </dgm:pt>
-    <dgm:pt modelId="{CD0B54AB-4041-4CDE-A5CD-915135C08959}" type="sibTrans" cxnId="{DF64292E-B5F9-4D53-BEE2-54048AA669F4}">
-      <dgm:prSet/>
-      <dgm:spPr/>
-      <dgm:t>
-        <a:bodyPr/>
-        <a:lstStyle/>
-        <a:p>
-          <a:endParaRPr lang="en-US"/>
-        </a:p>
-      </dgm:t>
-    </dgm:pt>
-    <dgm:pt modelId="{F9C2391B-7A12-4FA1-A0C7-A74D2CCE9A86}">
-      <dgm:prSet/>
-      <dgm:spPr/>
-      <dgm:t>
-        <a:bodyPr/>
-        <a:lstStyle/>
-        <a:p>
-          <a:r>
-            <a:rPr lang="en-US" dirty="0"/>
-            <a:t>Input Validation: Validates user input to prevent injection attacks.</a:t>
-          </a:r>
-        </a:p>
-      </dgm:t>
-    </dgm:pt>
-    <dgm:pt modelId="{9DDFB53E-AF26-4074-BF22-C1A5019C705A}" type="parTrans" cxnId="{C01CFC4B-FB67-48F4-8611-1C69D6945967}">
-      <dgm:prSet/>
-      <dgm:spPr/>
-      <dgm:t>
-        <a:bodyPr/>
-        <a:lstStyle/>
-        <a:p>
-          <a:endParaRPr lang="en-US"/>
-        </a:p>
-      </dgm:t>
-    </dgm:pt>
-    <dgm:pt modelId="{1C082AA4-F8E9-4E7F-9276-3B10B8CFB17F}" type="sibTrans" cxnId="{C01CFC4B-FB67-48F4-8611-1C69D6945967}">
-      <dgm:prSet/>
-      <dgm:spPr/>
-      <dgm:t>
-        <a:bodyPr/>
-        <a:lstStyle/>
-        <a:p>
-          <a:endParaRPr lang="en-US"/>
-        </a:p>
-      </dgm:t>
-    </dgm:pt>
-    <dgm:pt modelId="{7450FD8A-B57F-4F1E-AD1E-B7F6923308CF}" type="pres">
-      <dgm:prSet presAssocID="{64C74917-18CF-405D-860E-D0C3A684B7ED}" presName="vert0" presStyleCnt="0">
-        <dgm:presLayoutVars>
-          <dgm:dir/>
-          <dgm:animOne val="branch"/>
-          <dgm:animLvl val="lvl"/>
-        </dgm:presLayoutVars>
-      </dgm:prSet>
-      <dgm:spPr/>
-    </dgm:pt>
-    <dgm:pt modelId="{2D7C59FC-F92C-452F-8B90-4BA314F26ECB}" type="pres">
-      <dgm:prSet presAssocID="{C1D6BF9C-147A-4A18-A4AC-BFA1A3617070}" presName="thickLine" presStyleLbl="alignNode1" presStyleIdx="0" presStyleCnt="5"/>
-      <dgm:spPr/>
-    </dgm:pt>
-    <dgm:pt modelId="{C7A30C7E-3ACB-4BD3-AA9D-AB4859A180E6}" type="pres">
-      <dgm:prSet presAssocID="{C1D6BF9C-147A-4A18-A4AC-BFA1A3617070}" presName="horz1" presStyleCnt="0"/>
-      <dgm:spPr/>
-    </dgm:pt>
-    <dgm:pt modelId="{56110694-78B3-49D7-9479-C2A7AA12F71D}" type="pres">
-      <dgm:prSet presAssocID="{C1D6BF9C-147A-4A18-A4AC-BFA1A3617070}" presName="tx1" presStyleLbl="revTx" presStyleIdx="0" presStyleCnt="5"/>
-      <dgm:spPr/>
-    </dgm:pt>
-    <dgm:pt modelId="{75673BA3-8631-4082-B8F3-52E8F8C88836}" type="pres">
-      <dgm:prSet presAssocID="{C1D6BF9C-147A-4A18-A4AC-BFA1A3617070}" presName="vert1" presStyleCnt="0"/>
-      <dgm:spPr/>
-    </dgm:pt>
-    <dgm:pt modelId="{427CBBC2-FA08-4B50-A696-8FCB57E0B18E}" type="pres">
-      <dgm:prSet presAssocID="{BBCCD19C-55F1-489E-8D4E-F047EC65CC32}" presName="thickLine" presStyleLbl="alignNode1" presStyleIdx="1" presStyleCnt="5"/>
-      <dgm:spPr/>
-    </dgm:pt>
-    <dgm:pt modelId="{B38FABED-B81E-4143-B663-6DA8CB0182F4}" type="pres">
-      <dgm:prSet presAssocID="{BBCCD19C-55F1-489E-8D4E-F047EC65CC32}" presName="horz1" presStyleCnt="0"/>
-      <dgm:spPr/>
-    </dgm:pt>
-    <dgm:pt modelId="{AEB42E16-AB39-4DAD-BD7A-A1576D86FB61}" type="pres">
-      <dgm:prSet presAssocID="{BBCCD19C-55F1-489E-8D4E-F047EC65CC32}" presName="tx1" presStyleLbl="revTx" presStyleIdx="1" presStyleCnt="5"/>
-      <dgm:spPr/>
-    </dgm:pt>
-    <dgm:pt modelId="{6B0A5DC9-183E-415F-9949-BAAB0AAD6A01}" type="pres">
-      <dgm:prSet presAssocID="{BBCCD19C-55F1-489E-8D4E-F047EC65CC32}" presName="vert1" presStyleCnt="0"/>
-      <dgm:spPr/>
-    </dgm:pt>
-    <dgm:pt modelId="{9EE7325B-D064-4F5E-B566-23EFAF9AFF6A}" type="pres">
-      <dgm:prSet presAssocID="{2C657FEA-C5C9-457B-85D2-DAEB05F2C7F6}" presName="thickLine" presStyleLbl="alignNode1" presStyleIdx="2" presStyleCnt="5"/>
-      <dgm:spPr/>
-    </dgm:pt>
-    <dgm:pt modelId="{67C677A3-E6AC-4528-90FE-8BFC3F7DD4C7}" type="pres">
-      <dgm:prSet presAssocID="{2C657FEA-C5C9-457B-85D2-DAEB05F2C7F6}" presName="horz1" presStyleCnt="0"/>
-      <dgm:spPr/>
-    </dgm:pt>
-    <dgm:pt modelId="{71FDD4CF-FF4B-4656-BB71-BC3341B2B6EF}" type="pres">
-      <dgm:prSet presAssocID="{2C657FEA-C5C9-457B-85D2-DAEB05F2C7F6}" presName="tx1" presStyleLbl="revTx" presStyleIdx="2" presStyleCnt="5"/>
-      <dgm:spPr/>
-    </dgm:pt>
-    <dgm:pt modelId="{1499C4C8-3ABB-4619-9E02-A49601379810}" type="pres">
-      <dgm:prSet presAssocID="{2C657FEA-C5C9-457B-85D2-DAEB05F2C7F6}" presName="vert1" presStyleCnt="0"/>
-      <dgm:spPr/>
-    </dgm:pt>
-    <dgm:pt modelId="{8B2D1396-C915-4770-B2EC-B84B6D6B0CD9}" type="pres">
-      <dgm:prSet presAssocID="{B9D2CEBE-E2C3-4877-ADE3-E7D5585C9CEA}" presName="thickLine" presStyleLbl="alignNode1" presStyleIdx="3" presStyleCnt="5"/>
-      <dgm:spPr/>
-    </dgm:pt>
-    <dgm:pt modelId="{01301953-51A1-4F73-9774-5D62650B5B87}" type="pres">
-      <dgm:prSet presAssocID="{B9D2CEBE-E2C3-4877-ADE3-E7D5585C9CEA}" presName="horz1" presStyleCnt="0"/>
-      <dgm:spPr/>
-    </dgm:pt>
-    <dgm:pt modelId="{93C5156E-D8E3-4E36-95D8-C3F84197AC22}" type="pres">
-      <dgm:prSet presAssocID="{B9D2CEBE-E2C3-4877-ADE3-E7D5585C9CEA}" presName="tx1" presStyleLbl="revTx" presStyleIdx="3" presStyleCnt="5"/>
-      <dgm:spPr/>
-    </dgm:pt>
-    <dgm:pt modelId="{7413F555-AFEA-4B1C-A400-C7738F9301C2}" type="pres">
-      <dgm:prSet presAssocID="{B9D2CEBE-E2C3-4877-ADE3-E7D5585C9CEA}" presName="vert1" presStyleCnt="0"/>
-      <dgm:spPr/>
-    </dgm:pt>
-    <dgm:pt modelId="{2CEF8812-3C94-4901-BFCE-3A96B9A84A5A}" type="pres">
-      <dgm:prSet presAssocID="{F9C2391B-7A12-4FA1-A0C7-A74D2CCE9A86}" presName="thickLine" presStyleLbl="alignNode1" presStyleIdx="4" presStyleCnt="5"/>
-      <dgm:spPr/>
-    </dgm:pt>
-    <dgm:pt modelId="{2FF35EB5-F03F-466E-B439-AB0E8C34F832}" type="pres">
-      <dgm:prSet presAssocID="{F9C2391B-7A12-4FA1-A0C7-A74D2CCE9A86}" presName="horz1" presStyleCnt="0"/>
-      <dgm:spPr/>
-    </dgm:pt>
-    <dgm:pt modelId="{71AD26E6-D779-4473-9BF4-10D41D5A6531}" type="pres">
-      <dgm:prSet presAssocID="{F9C2391B-7A12-4FA1-A0C7-A74D2CCE9A86}" presName="tx1" presStyleLbl="revTx" presStyleIdx="4" presStyleCnt="5"/>
-      <dgm:spPr/>
-    </dgm:pt>
-    <dgm:pt modelId="{B0084284-4712-45E7-86DF-971514E5FE23}" type="pres">
-      <dgm:prSet presAssocID="{F9C2391B-7A12-4FA1-A0C7-A74D2CCE9A86}" presName="vert1" presStyleCnt="0"/>
-      <dgm:spPr/>
-    </dgm:pt>
-  </dgm:ptLst>
-  <dgm:cxnLst>
-    <dgm:cxn modelId="{DF64292E-B5F9-4D53-BEE2-54048AA669F4}" srcId="{64C74917-18CF-405D-860E-D0C3A684B7ED}" destId="{B9D2CEBE-E2C3-4877-ADE3-E7D5585C9CEA}" srcOrd="3" destOrd="0" parTransId="{CA36C7D7-AC61-436D-85B6-913CD437CAA6}" sibTransId="{CD0B54AB-4041-4CDE-A5CD-915135C08959}"/>
-    <dgm:cxn modelId="{15ACCC68-22A0-44A6-864E-CC532CC6B2BC}" type="presOf" srcId="{64C74917-18CF-405D-860E-D0C3A684B7ED}" destId="{7450FD8A-B57F-4F1E-AD1E-B7F6923308CF}" srcOrd="0" destOrd="0" presId="urn:microsoft.com/office/officeart/2008/layout/LinedList"/>
-    <dgm:cxn modelId="{C01CFC4B-FB67-48F4-8611-1C69D6945967}" srcId="{64C74917-18CF-405D-860E-D0C3A684B7ED}" destId="{F9C2391B-7A12-4FA1-A0C7-A74D2CCE9A86}" srcOrd="4" destOrd="0" parTransId="{9DDFB53E-AF26-4074-BF22-C1A5019C705A}" sibTransId="{1C082AA4-F8E9-4E7F-9276-3B10B8CFB17F}"/>
-    <dgm:cxn modelId="{836E754E-98C6-4C68-9A1F-8B4F8EBCFE1F}" srcId="{64C74917-18CF-405D-860E-D0C3A684B7ED}" destId="{C1D6BF9C-147A-4A18-A4AC-BFA1A3617070}" srcOrd="0" destOrd="0" parTransId="{CEA9992C-AEA8-4C03-B4D2-AE5FE8B2A934}" sibTransId="{00465AEA-468A-4316-B87D-70D0DC9DB9EB}"/>
-    <dgm:cxn modelId="{B3DACD81-A82D-48BA-970A-5D7BBAE7EBA0}" type="presOf" srcId="{B9D2CEBE-E2C3-4877-ADE3-E7D5585C9CEA}" destId="{93C5156E-D8E3-4E36-95D8-C3F84197AC22}" srcOrd="0" destOrd="0" presId="urn:microsoft.com/office/officeart/2008/layout/LinedList"/>
-    <dgm:cxn modelId="{D1D98BB4-F0CA-4A85-95A7-A0C0E13B6EFC}" srcId="{64C74917-18CF-405D-860E-D0C3A684B7ED}" destId="{BBCCD19C-55F1-489E-8D4E-F047EC65CC32}" srcOrd="1" destOrd="0" parTransId="{7DFCBDDF-39FD-4357-A1B3-41928A9BF26B}" sibTransId="{7A638918-9FBD-4B5D-9B7F-52D91F61D1E8}"/>
-    <dgm:cxn modelId="{8100F3C1-7B71-4151-A389-07EEE379C7F7}" type="presOf" srcId="{BBCCD19C-55F1-489E-8D4E-F047EC65CC32}" destId="{AEB42E16-AB39-4DAD-BD7A-A1576D86FB61}" srcOrd="0" destOrd="0" presId="urn:microsoft.com/office/officeart/2008/layout/LinedList"/>
-    <dgm:cxn modelId="{8ABBD3C7-BA68-4889-8D1B-3178560B558D}" type="presOf" srcId="{F9C2391B-7A12-4FA1-A0C7-A74D2CCE9A86}" destId="{71AD26E6-D779-4473-9BF4-10D41D5A6531}" srcOrd="0" destOrd="0" presId="urn:microsoft.com/office/officeart/2008/layout/LinedList"/>
-    <dgm:cxn modelId="{16A358E3-3F32-4665-B98F-E133D21A1D00}" srcId="{64C74917-18CF-405D-860E-D0C3A684B7ED}" destId="{2C657FEA-C5C9-457B-85D2-DAEB05F2C7F6}" srcOrd="2" destOrd="0" parTransId="{B93A0425-18A0-400E-8A92-85A8E58271D4}" sibTransId="{A57E44DD-630B-4169-91A2-B2A2A8242FDE}"/>
-    <dgm:cxn modelId="{92C5A3F2-33CE-4703-B3D5-1FBE45592F3C}" type="presOf" srcId="{2C657FEA-C5C9-457B-85D2-DAEB05F2C7F6}" destId="{71FDD4CF-FF4B-4656-BB71-BC3341B2B6EF}" srcOrd="0" destOrd="0" presId="urn:microsoft.com/office/officeart/2008/layout/LinedList"/>
-    <dgm:cxn modelId="{791DEBF2-F844-4D43-A851-B97390DA21C8}" type="presOf" srcId="{C1D6BF9C-147A-4A18-A4AC-BFA1A3617070}" destId="{56110694-78B3-49D7-9479-C2A7AA12F71D}" srcOrd="0" destOrd="0" presId="urn:microsoft.com/office/officeart/2008/layout/LinedList"/>
-    <dgm:cxn modelId="{C24C42AA-6DF8-42F0-8F19-CCD3D05E0AE2}" type="presParOf" srcId="{7450FD8A-B57F-4F1E-AD1E-B7F6923308CF}" destId="{2D7C59FC-F92C-452F-8B90-4BA314F26ECB}" srcOrd="0" destOrd="0" presId="urn:microsoft.com/office/officeart/2008/layout/LinedList"/>
-    <dgm:cxn modelId="{8A864A8D-76D2-4789-8725-2D9E6A10DE36}" type="presParOf" srcId="{7450FD8A-B57F-4F1E-AD1E-B7F6923308CF}" destId="{C7A30C7E-3ACB-4BD3-AA9D-AB4859A180E6}" srcOrd="1" destOrd="0" presId="urn:microsoft.com/office/officeart/2008/layout/LinedList"/>
-    <dgm:cxn modelId="{002F6840-3F59-4D8D-ABBE-8EF4CA002A44}" type="presParOf" srcId="{C7A30C7E-3ACB-4BD3-AA9D-AB4859A180E6}" destId="{56110694-78B3-49D7-9479-C2A7AA12F71D}" srcOrd="0" destOrd="0" presId="urn:microsoft.com/office/officeart/2008/layout/LinedList"/>
-    <dgm:cxn modelId="{19EBC646-E330-4AE0-A460-7A79772CBAF8}" type="presParOf" srcId="{C7A30C7E-3ACB-4BD3-AA9D-AB4859A180E6}" destId="{75673BA3-8631-4082-B8F3-52E8F8C88836}" srcOrd="1" destOrd="0" presId="urn:microsoft.com/office/officeart/2008/layout/LinedList"/>
-    <dgm:cxn modelId="{8BBBEC76-AAE4-4A06-9207-8AB9B5DED27D}" type="presParOf" srcId="{7450FD8A-B57F-4F1E-AD1E-B7F6923308CF}" destId="{427CBBC2-FA08-4B50-A696-8FCB57E0B18E}" srcOrd="2" destOrd="0" presId="urn:microsoft.com/office/officeart/2008/layout/LinedList"/>
-    <dgm:cxn modelId="{FF39AB99-5CEA-4A29-A054-D8F2FD98FD91}" type="presParOf" srcId="{7450FD8A-B57F-4F1E-AD1E-B7F6923308CF}" destId="{B38FABED-B81E-4143-B663-6DA8CB0182F4}" srcOrd="3" destOrd="0" presId="urn:microsoft.com/office/officeart/2008/layout/LinedList"/>
-    <dgm:cxn modelId="{CF9A8245-93D2-4D22-B82E-B5AB1D5CC580}" type="presParOf" srcId="{B38FABED-B81E-4143-B663-6DA8CB0182F4}" destId="{AEB42E16-AB39-4DAD-BD7A-A1576D86FB61}" srcOrd="0" destOrd="0" presId="urn:microsoft.com/office/officeart/2008/layout/LinedList"/>
-    <dgm:cxn modelId="{D33B6A24-AF09-4405-BA74-C32B799F6243}" type="presParOf" srcId="{B38FABED-B81E-4143-B663-6DA8CB0182F4}" destId="{6B0A5DC9-183E-415F-9949-BAAB0AAD6A01}" srcOrd="1" destOrd="0" presId="urn:microsoft.com/office/officeart/2008/layout/LinedList"/>
-    <dgm:cxn modelId="{196FEFA9-E7A3-4F21-BFDB-5606CFFFF1D3}" type="presParOf" srcId="{7450FD8A-B57F-4F1E-AD1E-B7F6923308CF}" destId="{9EE7325B-D064-4F5E-B566-23EFAF9AFF6A}" srcOrd="4" destOrd="0" presId="urn:microsoft.com/office/officeart/2008/layout/LinedList"/>
-    <dgm:cxn modelId="{317F27ED-9AA7-458C-B420-76D5007C3F5C}" type="presParOf" srcId="{7450FD8A-B57F-4F1E-AD1E-B7F6923308CF}" destId="{67C677A3-E6AC-4528-90FE-8BFC3F7DD4C7}" srcOrd="5" destOrd="0" presId="urn:microsoft.com/office/officeart/2008/layout/LinedList"/>
-    <dgm:cxn modelId="{81240139-23DA-45EE-8376-B9AC1416FDB3}" type="presParOf" srcId="{67C677A3-E6AC-4528-90FE-8BFC3F7DD4C7}" destId="{71FDD4CF-FF4B-4656-BB71-BC3341B2B6EF}" srcOrd="0" destOrd="0" presId="urn:microsoft.com/office/officeart/2008/layout/LinedList"/>
-    <dgm:cxn modelId="{A8FDE05C-5DE4-4289-B4FF-F3C1769459EB}" type="presParOf" srcId="{67C677A3-E6AC-4528-90FE-8BFC3F7DD4C7}" destId="{1499C4C8-3ABB-4619-9E02-A49601379810}" srcOrd="1" destOrd="0" presId="urn:microsoft.com/office/officeart/2008/layout/LinedList"/>
-    <dgm:cxn modelId="{304945FD-F040-4107-9DD6-24F8AAC2384C}" type="presParOf" srcId="{7450FD8A-B57F-4F1E-AD1E-B7F6923308CF}" destId="{8B2D1396-C915-4770-B2EC-B84B6D6B0CD9}" srcOrd="6" destOrd="0" presId="urn:microsoft.com/office/officeart/2008/layout/LinedList"/>
-    <dgm:cxn modelId="{85D48B51-1A64-4439-9FBD-7B2FF9B9540C}" type="presParOf" srcId="{7450FD8A-B57F-4F1E-AD1E-B7F6923308CF}" destId="{01301953-51A1-4F73-9774-5D62650B5B87}" srcOrd="7" destOrd="0" presId="urn:microsoft.com/office/officeart/2008/layout/LinedList"/>
-    <dgm:cxn modelId="{2C80F4A9-CB77-4C78-9AFB-20C065805810}" type="presParOf" srcId="{01301953-51A1-4F73-9774-5D62650B5B87}" destId="{93C5156E-D8E3-4E36-95D8-C3F84197AC22}" srcOrd="0" destOrd="0" presId="urn:microsoft.com/office/officeart/2008/layout/LinedList"/>
-    <dgm:cxn modelId="{08B4A8D4-7F4E-4AD7-AF9D-861FE4A0A761}" type="presParOf" srcId="{01301953-51A1-4F73-9774-5D62650B5B87}" destId="{7413F555-AFEA-4B1C-A400-C7738F9301C2}" srcOrd="1" destOrd="0" presId="urn:microsoft.com/office/officeart/2008/layout/LinedList"/>
-    <dgm:cxn modelId="{7B45584D-A2DD-4FB6-8C7E-787C89A0C1E5}" type="presParOf" srcId="{7450FD8A-B57F-4F1E-AD1E-B7F6923308CF}" destId="{2CEF8812-3C94-4901-BFCE-3A96B9A84A5A}" srcOrd="8" destOrd="0" presId="urn:microsoft.com/office/officeart/2008/layout/LinedList"/>
-    <dgm:cxn modelId="{06E14D05-4B51-461D-B14B-14B25A92244D}" type="presParOf" srcId="{7450FD8A-B57F-4F1E-AD1E-B7F6923308CF}" destId="{2FF35EB5-F03F-466E-B439-AB0E8C34F832}" srcOrd="9" destOrd="0" presId="urn:microsoft.com/office/officeart/2008/layout/LinedList"/>
-    <dgm:cxn modelId="{DC5D3FFE-4E36-4E40-B59B-8A2BCA8CB1D8}" type="presParOf" srcId="{2FF35EB5-F03F-466E-B439-AB0E8C34F832}" destId="{71AD26E6-D779-4473-9BF4-10D41D5A6531}" srcOrd="0" destOrd="0" presId="urn:microsoft.com/office/officeart/2008/layout/LinedList"/>
-    <dgm:cxn modelId="{25069995-4DF7-450A-894C-6876A0B6F59D}" type="presParOf" srcId="{2FF35EB5-F03F-466E-B439-AB0E8C34F832}" destId="{B0084284-4712-45E7-86DF-971514E5FE23}" srcOrd="1" destOrd="0" presId="urn:microsoft.com/office/officeart/2008/layout/LinedList"/>
-  </dgm:cxnLst>
-  <dgm:bg/>
-  <dgm:whole/>
-  <dgm:extLst>
-    <a:ext uri="http://schemas.microsoft.com/office/drawing/2008/diagram">
-      <dsp:dataModelExt xmlns:dsp="http://schemas.microsoft.com/office/drawing/2008/diagram" relId="rId7" minVer="http://schemas.openxmlformats.org/drawingml/2006/diagram"/>
-    </a:ext>
-  </dgm:extLst>
-</dgm:dataModel>
-</file>
-
-<file path=ppt/diagrams/drawing1.xml><?xml version="1.0" encoding="utf-8"?>
-<dsp:drawing xmlns:dgm="http://schemas.openxmlformats.org/drawingml/2006/diagram" xmlns:dsp="http://schemas.microsoft.com/office/drawing/2008/diagram" xmlns:a="http://schemas.openxmlformats.org/drawingml/2006/main">
-  <dsp:spTree>
-    <dsp:nvGrpSpPr>
-      <dsp:cNvPr id="0" name=""/>
-      <dsp:cNvGrpSpPr/>
-    </dsp:nvGrpSpPr>
-    <dsp:grpSpPr/>
-    <dsp:sp modelId="{2D7C59FC-F92C-452F-8B90-4BA314F26ECB}">
-      <dsp:nvSpPr>
-        <dsp:cNvPr id="0" name=""/>
-        <dsp:cNvSpPr/>
-      </dsp:nvSpPr>
-      <dsp:spPr>
-        <a:xfrm>
-          <a:off x="0" y="565"/>
-          <a:ext cx="5924550" cy="0"/>
-        </a:xfrm>
-        <a:prstGeom prst="line">
-          <a:avLst/>
-        </a:prstGeom>
-        <a:gradFill rotWithShape="0">
-          <a:gsLst>
-            <a:gs pos="0">
-              <a:schemeClr val="accent2">
-                <a:hueOff val="0"/>
-                <a:satOff val="0"/>
-                <a:lumOff val="0"/>
-                <a:alphaOff val="0"/>
-                <a:tint val="94000"/>
-                <a:satMod val="100000"/>
-                <a:lumMod val="104000"/>
-              </a:schemeClr>
-            </a:gs>
-            <a:gs pos="69000">
-              <a:schemeClr val="accent2">
-                <a:hueOff val="0"/>
-                <a:satOff val="0"/>
-                <a:lumOff val="0"/>
-                <a:alphaOff val="0"/>
-                <a:shade val="86000"/>
-                <a:satMod val="130000"/>
-                <a:lumMod val="102000"/>
-              </a:schemeClr>
-            </a:gs>
-            <a:gs pos="100000">
-              <a:schemeClr val="accent2">
-                <a:hueOff val="0"/>
-                <a:satOff val="0"/>
-                <a:lumOff val="0"/>
-                <a:alphaOff val="0"/>
-                <a:shade val="72000"/>
-                <a:satMod val="130000"/>
-                <a:lumMod val="100000"/>
-              </a:schemeClr>
-            </a:gs>
-          </a:gsLst>
-          <a:lin ang="5400000" scaled="0"/>
-        </a:gradFill>
-        <a:ln w="12700" cap="flat" cmpd="sng" algn="ctr">
-          <a:solidFill>
-            <a:schemeClr val="accent2">
-              <a:hueOff val="0"/>
-              <a:satOff val="0"/>
-              <a:lumOff val="0"/>
-              <a:alphaOff val="0"/>
-            </a:schemeClr>
-          </a:solidFill>
-          <a:prstDash val="solid"/>
-        </a:ln>
-        <a:effectLst>
-          <a:outerShdw blurRad="50800" dist="38100" dir="5400000" sy="96000" rotWithShape="0">
-            <a:srgbClr val="000000">
-              <a:alpha val="54000"/>
-            </a:srgbClr>
-          </a:outerShdw>
-        </a:effectLst>
-      </dsp:spPr>
-      <dsp:style>
-        <a:lnRef idx="1">
-          <a:scrgbClr r="0" g="0" b="0"/>
-        </a:lnRef>
-        <a:fillRef idx="3">
-          <a:scrgbClr r="0" g="0" b="0"/>
-        </a:fillRef>
-        <a:effectRef idx="2">
-          <a:scrgbClr r="0" g="0" b="0"/>
-        </a:effectRef>
-        <a:fontRef idx="minor">
-          <a:schemeClr val="lt1"/>
-        </a:fontRef>
-      </dsp:style>
-    </dsp:sp>
-    <dsp:sp modelId="{56110694-78B3-49D7-9479-C2A7AA12F71D}">
-      <dsp:nvSpPr>
-        <dsp:cNvPr id="0" name=""/>
-        <dsp:cNvSpPr/>
-      </dsp:nvSpPr>
-      <dsp:spPr>
-        <a:xfrm>
-          <a:off x="0" y="565"/>
-          <a:ext cx="5924550" cy="925603"/>
-        </a:xfrm>
-        <a:prstGeom prst="rect">
-          <a:avLst/>
-        </a:prstGeom>
-        <a:noFill/>
-        <a:ln>
-          <a:noFill/>
-        </a:ln>
-        <a:effectLst/>
-      </dsp:spPr>
-      <dsp:style>
-        <a:lnRef idx="0">
-          <a:scrgbClr r="0" g="0" b="0"/>
-        </a:lnRef>
-        <a:fillRef idx="0">
-          <a:scrgbClr r="0" g="0" b="0"/>
-        </a:fillRef>
-        <a:effectRef idx="0">
-          <a:scrgbClr r="0" g="0" b="0"/>
-        </a:effectRef>
-        <a:fontRef idx="minor"/>
-      </dsp:style>
-      <dsp:txBody>
-        <a:bodyPr spcFirstLastPara="0" vert="horz" wrap="square" lIns="99060" tIns="99060" rIns="99060" bIns="99060" numCol="1" spcCol="1270" anchor="t" anchorCtr="0">
-          <a:noAutofit/>
-        </a:bodyPr>
-        <a:lstStyle/>
-        <a:p>
-          <a:pPr marL="0" lvl="0" indent="0" algn="l" defTabSz="1155700">
-            <a:lnSpc>
-              <a:spcPct val="90000"/>
-            </a:lnSpc>
-            <a:spcBef>
-              <a:spcPct val="0"/>
-            </a:spcBef>
-            <a:spcAft>
-              <a:spcPct val="35000"/>
-            </a:spcAft>
-            <a:buNone/>
-          </a:pPr>
-          <a:r>
-            <a:rPr lang="en-US" sz="2600" kern="1200" dirty="0"/>
-            <a:t>Security is a top priority in </a:t>
-          </a:r>
-          <a:r>
-            <a:rPr lang="en-US" sz="2600" kern="1200" dirty="0" err="1"/>
-            <a:t>UrbanBloom</a:t>
-          </a:r>
-          <a:r>
-            <a:rPr lang="en-US" sz="2600" kern="1200" dirty="0"/>
-            <a:t>, with features including </a:t>
-          </a:r>
-        </a:p>
-      </dsp:txBody>
-      <dsp:txXfrm>
-        <a:off x="0" y="565"/>
-        <a:ext cx="5924550" cy="925603"/>
-      </dsp:txXfrm>
-    </dsp:sp>
-    <dsp:sp modelId="{427CBBC2-FA08-4B50-A696-8FCB57E0B18E}">
-      <dsp:nvSpPr>
-        <dsp:cNvPr id="0" name=""/>
-        <dsp:cNvSpPr/>
-      </dsp:nvSpPr>
-      <dsp:spPr>
-        <a:xfrm>
-          <a:off x="0" y="926169"/>
-          <a:ext cx="5924550" cy="0"/>
-        </a:xfrm>
-        <a:prstGeom prst="line">
-          <a:avLst/>
-        </a:prstGeom>
-        <a:gradFill rotWithShape="0">
-          <a:gsLst>
-            <a:gs pos="0">
-              <a:schemeClr val="accent2">
-                <a:hueOff val="553230"/>
-                <a:satOff val="2550"/>
-                <a:lumOff val="392"/>
-                <a:alphaOff val="0"/>
-                <a:tint val="94000"/>
-                <a:satMod val="100000"/>
-                <a:lumMod val="104000"/>
-              </a:schemeClr>
-            </a:gs>
-            <a:gs pos="69000">
-              <a:schemeClr val="accent2">
-                <a:hueOff val="553230"/>
-                <a:satOff val="2550"/>
-                <a:lumOff val="392"/>
-                <a:alphaOff val="0"/>
-                <a:shade val="86000"/>
-                <a:satMod val="130000"/>
-                <a:lumMod val="102000"/>
-              </a:schemeClr>
-            </a:gs>
-            <a:gs pos="100000">
-              <a:schemeClr val="accent2">
-                <a:hueOff val="553230"/>
-                <a:satOff val="2550"/>
-                <a:lumOff val="392"/>
-                <a:alphaOff val="0"/>
-                <a:shade val="72000"/>
-                <a:satMod val="130000"/>
-                <a:lumMod val="100000"/>
-              </a:schemeClr>
-            </a:gs>
-          </a:gsLst>
-          <a:lin ang="5400000" scaled="0"/>
-        </a:gradFill>
-        <a:ln w="12700" cap="flat" cmpd="sng" algn="ctr">
-          <a:solidFill>
-            <a:schemeClr val="accent2">
-              <a:hueOff val="553230"/>
-              <a:satOff val="2550"/>
-              <a:lumOff val="392"/>
-              <a:alphaOff val="0"/>
-            </a:schemeClr>
-          </a:solidFill>
-          <a:prstDash val="solid"/>
-        </a:ln>
-        <a:effectLst>
-          <a:outerShdw blurRad="50800" dist="38100" dir="5400000" sy="96000" rotWithShape="0">
-            <a:srgbClr val="000000">
-              <a:alpha val="54000"/>
-            </a:srgbClr>
-          </a:outerShdw>
-        </a:effectLst>
-      </dsp:spPr>
-      <dsp:style>
-        <a:lnRef idx="1">
-          <a:scrgbClr r="0" g="0" b="0"/>
-        </a:lnRef>
-        <a:fillRef idx="3">
-          <a:scrgbClr r="0" g="0" b="0"/>
-        </a:fillRef>
-        <a:effectRef idx="2">
-          <a:scrgbClr r="0" g="0" b="0"/>
-        </a:effectRef>
-        <a:fontRef idx="minor">
-          <a:schemeClr val="lt1"/>
-        </a:fontRef>
-      </dsp:style>
-    </dsp:sp>
-    <dsp:sp modelId="{AEB42E16-AB39-4DAD-BD7A-A1576D86FB61}">
-      <dsp:nvSpPr>
-        <dsp:cNvPr id="0" name=""/>
-        <dsp:cNvSpPr/>
-      </dsp:nvSpPr>
-      <dsp:spPr>
-        <a:xfrm>
-          <a:off x="0" y="926169"/>
-          <a:ext cx="5924550" cy="925603"/>
-        </a:xfrm>
-        <a:prstGeom prst="rect">
-          <a:avLst/>
-        </a:prstGeom>
-        <a:noFill/>
-        <a:ln>
-          <a:noFill/>
-        </a:ln>
-        <a:effectLst/>
-      </dsp:spPr>
-      <dsp:style>
-        <a:lnRef idx="0">
-          <a:scrgbClr r="0" g="0" b="0"/>
-        </a:lnRef>
-        <a:fillRef idx="0">
-          <a:scrgbClr r="0" g="0" b="0"/>
-        </a:fillRef>
-        <a:effectRef idx="0">
-          <a:scrgbClr r="0" g="0" b="0"/>
-        </a:effectRef>
-        <a:fontRef idx="minor"/>
-      </dsp:style>
-      <dsp:txBody>
-        <a:bodyPr spcFirstLastPara="0" vert="horz" wrap="square" lIns="99060" tIns="99060" rIns="99060" bIns="99060" numCol="1" spcCol="1270" anchor="t" anchorCtr="0">
-          <a:noAutofit/>
-        </a:bodyPr>
-        <a:lstStyle/>
-        <a:p>
-          <a:pPr marL="0" lvl="0" indent="0" algn="l" defTabSz="1155700">
-            <a:lnSpc>
-              <a:spcPct val="90000"/>
-            </a:lnSpc>
-            <a:spcBef>
-              <a:spcPct val="0"/>
-            </a:spcBef>
-            <a:spcAft>
-              <a:spcPct val="35000"/>
-            </a:spcAft>
-            <a:buNone/>
-          </a:pPr>
-          <a:r>
-            <a:rPr lang="en-US" sz="2600" kern="1200" dirty="0"/>
-            <a:t>JWT Authentication: Tokens are used for secure login.</a:t>
-          </a:r>
-        </a:p>
-      </dsp:txBody>
-      <dsp:txXfrm>
-        <a:off x="0" y="926169"/>
-        <a:ext cx="5924550" cy="925603"/>
-      </dsp:txXfrm>
-    </dsp:sp>
-    <dsp:sp modelId="{9EE7325B-D064-4F5E-B566-23EFAF9AFF6A}">
-      <dsp:nvSpPr>
-        <dsp:cNvPr id="0" name=""/>
-        <dsp:cNvSpPr/>
-      </dsp:nvSpPr>
-      <dsp:spPr>
-        <a:xfrm>
-          <a:off x="0" y="1851773"/>
-          <a:ext cx="5924550" cy="0"/>
-        </a:xfrm>
-        <a:prstGeom prst="line">
-          <a:avLst/>
-        </a:prstGeom>
-        <a:gradFill rotWithShape="0">
-          <a:gsLst>
-            <a:gs pos="0">
-              <a:schemeClr val="accent2">
-                <a:hueOff val="1106460"/>
-                <a:satOff val="5101"/>
-                <a:lumOff val="784"/>
-                <a:alphaOff val="0"/>
-                <a:tint val="94000"/>
-                <a:satMod val="100000"/>
-                <a:lumMod val="104000"/>
-              </a:schemeClr>
-            </a:gs>
-            <a:gs pos="69000">
-              <a:schemeClr val="accent2">
-                <a:hueOff val="1106460"/>
-                <a:satOff val="5101"/>
-                <a:lumOff val="784"/>
-                <a:alphaOff val="0"/>
-                <a:shade val="86000"/>
-                <a:satMod val="130000"/>
-                <a:lumMod val="102000"/>
-              </a:schemeClr>
-            </a:gs>
-            <a:gs pos="100000">
-              <a:schemeClr val="accent2">
-                <a:hueOff val="1106460"/>
-                <a:satOff val="5101"/>
-                <a:lumOff val="784"/>
-                <a:alphaOff val="0"/>
-                <a:shade val="72000"/>
-                <a:satMod val="130000"/>
-                <a:lumMod val="100000"/>
-              </a:schemeClr>
-            </a:gs>
-          </a:gsLst>
-          <a:lin ang="5400000" scaled="0"/>
-        </a:gradFill>
-        <a:ln w="12700" cap="flat" cmpd="sng" algn="ctr">
-          <a:solidFill>
-            <a:schemeClr val="accent2">
-              <a:hueOff val="1106460"/>
-              <a:satOff val="5101"/>
-              <a:lumOff val="784"/>
-              <a:alphaOff val="0"/>
-            </a:schemeClr>
-          </a:solidFill>
-          <a:prstDash val="solid"/>
-        </a:ln>
-        <a:effectLst>
-          <a:outerShdw blurRad="50800" dist="38100" dir="5400000" sy="96000" rotWithShape="0">
-            <a:srgbClr val="000000">
-              <a:alpha val="54000"/>
-            </a:srgbClr>
-          </a:outerShdw>
-        </a:effectLst>
-      </dsp:spPr>
-      <dsp:style>
-        <a:lnRef idx="1">
-          <a:scrgbClr r="0" g="0" b="0"/>
-        </a:lnRef>
-        <a:fillRef idx="3">
-          <a:scrgbClr r="0" g="0" b="0"/>
-        </a:fillRef>
-        <a:effectRef idx="2">
-          <a:scrgbClr r="0" g="0" b="0"/>
-        </a:effectRef>
-        <a:fontRef idx="minor">
-          <a:schemeClr val="lt1"/>
-        </a:fontRef>
-      </dsp:style>
-    </dsp:sp>
-    <dsp:sp modelId="{71FDD4CF-FF4B-4656-BB71-BC3341B2B6EF}">
-      <dsp:nvSpPr>
-        <dsp:cNvPr id="0" name=""/>
-        <dsp:cNvSpPr/>
-      </dsp:nvSpPr>
-      <dsp:spPr>
-        <a:xfrm>
-          <a:off x="0" y="1851773"/>
-          <a:ext cx="5924550" cy="925603"/>
-        </a:xfrm>
-        <a:prstGeom prst="rect">
-          <a:avLst/>
-        </a:prstGeom>
-        <a:noFill/>
-        <a:ln>
-          <a:noFill/>
-        </a:ln>
-        <a:effectLst/>
-      </dsp:spPr>
-      <dsp:style>
-        <a:lnRef idx="0">
-          <a:scrgbClr r="0" g="0" b="0"/>
-        </a:lnRef>
-        <a:fillRef idx="0">
-          <a:scrgbClr r="0" g="0" b="0"/>
-        </a:fillRef>
-        <a:effectRef idx="0">
-          <a:scrgbClr r="0" g="0" b="0"/>
-        </a:effectRef>
-        <a:fontRef idx="minor"/>
-      </dsp:style>
-      <dsp:txBody>
-        <a:bodyPr spcFirstLastPara="0" vert="horz" wrap="square" lIns="99060" tIns="99060" rIns="99060" bIns="99060" numCol="1" spcCol="1270" anchor="t" anchorCtr="0">
-          <a:noAutofit/>
-        </a:bodyPr>
-        <a:lstStyle/>
-        <a:p>
-          <a:pPr marL="0" lvl="0" indent="0" algn="l" defTabSz="1155700">
-            <a:lnSpc>
-              <a:spcPct val="90000"/>
-            </a:lnSpc>
-            <a:spcBef>
-              <a:spcPct val="0"/>
-            </a:spcBef>
-            <a:spcAft>
-              <a:spcPct val="35000"/>
-            </a:spcAft>
-            <a:buNone/>
-          </a:pPr>
-          <a:r>
-            <a:rPr lang="en-US" sz="2600" kern="1200" dirty="0"/>
-            <a:t>Role-Based Access Control: Ensures access to only permitted resources.</a:t>
-          </a:r>
-        </a:p>
-      </dsp:txBody>
-      <dsp:txXfrm>
-        <a:off x="0" y="1851773"/>
-        <a:ext cx="5924550" cy="925603"/>
-      </dsp:txXfrm>
-    </dsp:sp>
-    <dsp:sp modelId="{8B2D1396-C915-4770-B2EC-B84B6D6B0CD9}">
-      <dsp:nvSpPr>
-        <dsp:cNvPr id="0" name=""/>
-        <dsp:cNvSpPr/>
-      </dsp:nvSpPr>
-      <dsp:spPr>
-        <a:xfrm>
-          <a:off x="0" y="2777376"/>
-          <a:ext cx="5924550" cy="0"/>
-        </a:xfrm>
-        <a:prstGeom prst="line">
-          <a:avLst/>
-        </a:prstGeom>
-        <a:gradFill rotWithShape="0">
-          <a:gsLst>
-            <a:gs pos="0">
-              <a:schemeClr val="accent2">
-                <a:hueOff val="1659690"/>
-                <a:satOff val="7651"/>
-                <a:lumOff val="1177"/>
-                <a:alphaOff val="0"/>
-                <a:tint val="94000"/>
-                <a:satMod val="100000"/>
-                <a:lumMod val="104000"/>
-              </a:schemeClr>
-            </a:gs>
-            <a:gs pos="69000">
-              <a:schemeClr val="accent2">
-                <a:hueOff val="1659690"/>
-                <a:satOff val="7651"/>
-                <a:lumOff val="1177"/>
-                <a:alphaOff val="0"/>
-                <a:shade val="86000"/>
-                <a:satMod val="130000"/>
-                <a:lumMod val="102000"/>
-              </a:schemeClr>
-            </a:gs>
-            <a:gs pos="100000">
-              <a:schemeClr val="accent2">
-                <a:hueOff val="1659690"/>
-                <a:satOff val="7651"/>
-                <a:lumOff val="1177"/>
-                <a:alphaOff val="0"/>
-                <a:shade val="72000"/>
-                <a:satMod val="130000"/>
-                <a:lumMod val="100000"/>
-              </a:schemeClr>
-            </a:gs>
-          </a:gsLst>
-          <a:lin ang="5400000" scaled="0"/>
-        </a:gradFill>
-        <a:ln w="12700" cap="flat" cmpd="sng" algn="ctr">
-          <a:solidFill>
-            <a:schemeClr val="accent2">
-              <a:hueOff val="1659690"/>
-              <a:satOff val="7651"/>
-              <a:lumOff val="1177"/>
-              <a:alphaOff val="0"/>
-            </a:schemeClr>
-          </a:solidFill>
-          <a:prstDash val="solid"/>
-        </a:ln>
-        <a:effectLst>
-          <a:outerShdw blurRad="50800" dist="38100" dir="5400000" sy="96000" rotWithShape="0">
-            <a:srgbClr val="000000">
-              <a:alpha val="54000"/>
-            </a:srgbClr>
-          </a:outerShdw>
-        </a:effectLst>
-      </dsp:spPr>
-      <dsp:style>
-        <a:lnRef idx="1">
-          <a:scrgbClr r="0" g="0" b="0"/>
-        </a:lnRef>
-        <a:fillRef idx="3">
-          <a:scrgbClr r="0" g="0" b="0"/>
-        </a:fillRef>
-        <a:effectRef idx="2">
-          <a:scrgbClr r="0" g="0" b="0"/>
-        </a:effectRef>
-        <a:fontRef idx="minor">
-          <a:schemeClr val="lt1"/>
-        </a:fontRef>
-      </dsp:style>
-    </dsp:sp>
-    <dsp:sp modelId="{93C5156E-D8E3-4E36-95D8-C3F84197AC22}">
-      <dsp:nvSpPr>
-        <dsp:cNvPr id="0" name=""/>
-        <dsp:cNvSpPr/>
-      </dsp:nvSpPr>
-      <dsp:spPr>
-        <a:xfrm>
-          <a:off x="0" y="2777376"/>
-          <a:ext cx="5924550" cy="925603"/>
-        </a:xfrm>
-        <a:prstGeom prst="rect">
-          <a:avLst/>
-        </a:prstGeom>
-        <a:noFill/>
-        <a:ln>
-          <a:noFill/>
-        </a:ln>
-        <a:effectLst/>
-      </dsp:spPr>
-      <dsp:style>
-        <a:lnRef idx="0">
-          <a:scrgbClr r="0" g="0" b="0"/>
-        </a:lnRef>
-        <a:fillRef idx="0">
-          <a:scrgbClr r="0" g="0" b="0"/>
-        </a:fillRef>
-        <a:effectRef idx="0">
-          <a:scrgbClr r="0" g="0" b="0"/>
-        </a:effectRef>
-        <a:fontRef idx="minor"/>
-      </dsp:style>
-      <dsp:txBody>
-        <a:bodyPr spcFirstLastPara="0" vert="horz" wrap="square" lIns="99060" tIns="99060" rIns="99060" bIns="99060" numCol="1" spcCol="1270" anchor="t" anchorCtr="0">
-          <a:noAutofit/>
-        </a:bodyPr>
-        <a:lstStyle/>
-        <a:p>
-          <a:pPr marL="0" lvl="0" indent="0" algn="l" defTabSz="1155700">
-            <a:lnSpc>
-              <a:spcPct val="90000"/>
-            </a:lnSpc>
-            <a:spcBef>
-              <a:spcPct val="0"/>
-            </a:spcBef>
-            <a:spcAft>
-              <a:spcPct val="35000"/>
-            </a:spcAft>
-            <a:buNone/>
-          </a:pPr>
-          <a:r>
-            <a:rPr lang="en-US" sz="2600" kern="1200"/>
-            <a:t>Data Encryption: Encrypts sensitive data in transit and at rest.</a:t>
-          </a:r>
-        </a:p>
-      </dsp:txBody>
-      <dsp:txXfrm>
-        <a:off x="0" y="2777376"/>
-        <a:ext cx="5924550" cy="925603"/>
-      </dsp:txXfrm>
-    </dsp:sp>
-    <dsp:sp modelId="{2CEF8812-3C94-4901-BFCE-3A96B9A84A5A}">
-      <dsp:nvSpPr>
-        <dsp:cNvPr id="0" name=""/>
-        <dsp:cNvSpPr/>
-      </dsp:nvSpPr>
-      <dsp:spPr>
-        <a:xfrm>
-          <a:off x="0" y="3702980"/>
-          <a:ext cx="5924550" cy="0"/>
-        </a:xfrm>
-        <a:prstGeom prst="line">
-          <a:avLst/>
-        </a:prstGeom>
-        <a:gradFill rotWithShape="0">
-          <a:gsLst>
-            <a:gs pos="0">
-              <a:schemeClr val="accent2">
-                <a:hueOff val="2212920"/>
-                <a:satOff val="10201"/>
-                <a:lumOff val="1569"/>
-                <a:alphaOff val="0"/>
-                <a:tint val="94000"/>
-                <a:satMod val="100000"/>
-                <a:lumMod val="104000"/>
-              </a:schemeClr>
-            </a:gs>
-            <a:gs pos="69000">
-              <a:schemeClr val="accent2">
-                <a:hueOff val="2212920"/>
-                <a:satOff val="10201"/>
-                <a:lumOff val="1569"/>
-                <a:alphaOff val="0"/>
-                <a:shade val="86000"/>
-                <a:satMod val="130000"/>
-                <a:lumMod val="102000"/>
-              </a:schemeClr>
-            </a:gs>
-            <a:gs pos="100000">
-              <a:schemeClr val="accent2">
-                <a:hueOff val="2212920"/>
-                <a:satOff val="10201"/>
-                <a:lumOff val="1569"/>
-                <a:alphaOff val="0"/>
-                <a:shade val="72000"/>
-                <a:satMod val="130000"/>
-                <a:lumMod val="100000"/>
-              </a:schemeClr>
-            </a:gs>
-          </a:gsLst>
-          <a:lin ang="5400000" scaled="0"/>
-        </a:gradFill>
-        <a:ln w="12700" cap="flat" cmpd="sng" algn="ctr">
-          <a:solidFill>
-            <a:schemeClr val="accent2">
-              <a:hueOff val="2212920"/>
-              <a:satOff val="10201"/>
-              <a:lumOff val="1569"/>
-              <a:alphaOff val="0"/>
-            </a:schemeClr>
-          </a:solidFill>
-          <a:prstDash val="solid"/>
-        </a:ln>
-        <a:effectLst>
-          <a:outerShdw blurRad="50800" dist="38100" dir="5400000" sy="96000" rotWithShape="0">
-            <a:srgbClr val="000000">
-              <a:alpha val="54000"/>
-            </a:srgbClr>
-          </a:outerShdw>
-        </a:effectLst>
-      </dsp:spPr>
-      <dsp:style>
-        <a:lnRef idx="1">
-          <a:scrgbClr r="0" g="0" b="0"/>
-        </a:lnRef>
-        <a:fillRef idx="3">
-          <a:scrgbClr r="0" g="0" b="0"/>
-        </a:fillRef>
-        <a:effectRef idx="2">
-          <a:scrgbClr r="0" g="0" b="0"/>
-        </a:effectRef>
-        <a:fontRef idx="minor">
-          <a:schemeClr val="lt1"/>
-        </a:fontRef>
-      </dsp:style>
-    </dsp:sp>
-    <dsp:sp modelId="{71AD26E6-D779-4473-9BF4-10D41D5A6531}">
-      <dsp:nvSpPr>
-        <dsp:cNvPr id="0" name=""/>
-        <dsp:cNvSpPr/>
-      </dsp:nvSpPr>
-      <dsp:spPr>
-        <a:xfrm>
-          <a:off x="0" y="3702980"/>
-          <a:ext cx="5924550" cy="925603"/>
-        </a:xfrm>
-        <a:prstGeom prst="rect">
-          <a:avLst/>
-        </a:prstGeom>
-        <a:noFill/>
-        <a:ln>
-          <a:noFill/>
-        </a:ln>
-        <a:effectLst/>
-      </dsp:spPr>
-      <dsp:style>
-        <a:lnRef idx="0">
-          <a:scrgbClr r="0" g="0" b="0"/>
-        </a:lnRef>
-        <a:fillRef idx="0">
-          <a:scrgbClr r="0" g="0" b="0"/>
-        </a:fillRef>
-        <a:effectRef idx="0">
-          <a:scrgbClr r="0" g="0" b="0"/>
-        </a:effectRef>
-        <a:fontRef idx="minor"/>
-      </dsp:style>
-      <dsp:txBody>
-        <a:bodyPr spcFirstLastPara="0" vert="horz" wrap="square" lIns="99060" tIns="99060" rIns="99060" bIns="99060" numCol="1" spcCol="1270" anchor="t" anchorCtr="0">
-          <a:noAutofit/>
-        </a:bodyPr>
-        <a:lstStyle/>
-        <a:p>
-          <a:pPr marL="0" lvl="0" indent="0" algn="l" defTabSz="1155700">
-            <a:lnSpc>
-              <a:spcPct val="90000"/>
-            </a:lnSpc>
-            <a:spcBef>
-              <a:spcPct val="0"/>
-            </a:spcBef>
-            <a:spcAft>
-              <a:spcPct val="35000"/>
-            </a:spcAft>
-            <a:buNone/>
-          </a:pPr>
-          <a:r>
-            <a:rPr lang="en-US" sz="2600" kern="1200" dirty="0"/>
-            <a:t>Input Validation: Validates user input to prevent injection attacks.</a:t>
-          </a:r>
-        </a:p>
-      </dsp:txBody>
-      <dsp:txXfrm>
-        <a:off x="0" y="3702980"/>
-        <a:ext cx="5924550" cy="925603"/>
-      </dsp:txXfrm>
-    </dsp:sp>
-  </dsp:spTree>
-</dsp:drawing>
-</file>
-
-<file path=ppt/diagrams/layout1.xml><?xml version="1.0" encoding="utf-8"?>
-<dgm:layoutDef xmlns:dgm="http://schemas.openxmlformats.org/drawingml/2006/diagram" xmlns:a="http://schemas.openxmlformats.org/drawingml/2006/main" uniqueId="urn:microsoft.com/office/officeart/2008/layout/LinedList">
-  <dgm:title val=""/>
-  <dgm:desc val=""/>
-  <dgm:catLst>
-    <dgm:cat type="hierarchy" pri="8000"/>
-    <dgm:cat type="list" pri="2500"/>
-  </dgm:catLst>
-  <dgm:sampData>
-    <dgm:dataModel>
-      <dgm:ptLst>
-        <dgm:pt modelId="0" type="doc"/>
-        <dgm:pt modelId="1">
-          <dgm:prSet phldr="1"/>
-        </dgm:pt>
-        <dgm:pt modelId="11">
-          <dgm:prSet phldr="1"/>
-        </dgm:pt>
-        <dgm:pt modelId="12">
-          <dgm:prSet phldr="1"/>
-        </dgm:pt>
-        <dgm:pt modelId="13">
-          <dgm:prSet phldr="1"/>
-        </dgm:pt>
-      </dgm:ptLst>
-      <dgm:cxnLst>
-        <dgm:cxn modelId="2" srcId="0" destId="1" srcOrd="0" destOrd="0"/>
-        <dgm:cxn modelId="3" srcId="1" destId="11" srcOrd="0" destOrd="0"/>
-        <dgm:cxn modelId="4" srcId="1" destId="12" srcOrd="1" destOrd="0"/>
-        <dgm:cxn modelId="5" srcId="1" destId="13" srcOrd="2" destOrd="0"/>
-      </dgm:cxnLst>
-      <dgm:bg/>
-      <dgm:whole/>
-    </dgm:dataModel>
-  </dgm:sampData>
-  <dgm:styleData>
-    <dgm:dataModel>
-      <dgm:ptLst>
-        <dgm:pt modelId="0" type="doc"/>
-        <dgm:pt modelId="1">
-          <dgm:prSet phldr="1"/>
-        </dgm:pt>
-        <dgm:pt modelId="11">
-          <dgm:prSet phldr="1"/>
-        </dgm:pt>
-        <dgm:pt modelId="12">
-          <dgm:prSet phldr="1"/>
-        </dgm:pt>
-      </dgm:ptLst>
-      <dgm:cxnLst>
-        <dgm:cxn modelId="2" srcId="0" destId="1" srcOrd="0" destOrd="0"/>
-        <dgm:cxn modelId="3" srcId="1" destId="11" srcOrd="0" destOrd="0"/>
-        <dgm:cxn modelId="4" srcId="1" destId="12" srcOrd="1" destOrd="0"/>
-      </dgm:cxnLst>
-      <dgm:bg/>
-      <dgm:whole/>
-    </dgm:dataModel>
-  </dgm:styleData>
-  <dgm:clrData>
-    <dgm:dataModel>
-      <dgm:ptLst>
-        <dgm:pt modelId="0" type="doc"/>
-        <dgm:pt modelId="1">
-          <dgm:prSet phldr="1"/>
-        </dgm:pt>
-        <dgm:pt modelId="11">
-          <dgm:prSet phldr="1"/>
-        </dgm:pt>
-        <dgm:pt modelId="12">
-          <dgm:prSet phldr="1"/>
-        </dgm:pt>
-      </dgm:ptLst>
-      <dgm:cxnLst>
-        <dgm:cxn modelId="2" srcId="0" destId="1" srcOrd="0" destOrd="0"/>
-        <dgm:cxn modelId="3" srcId="1" destId="11" srcOrd="0" destOrd="0"/>
-        <dgm:cxn modelId="4" srcId="1" destId="12" srcOrd="1" destOrd="0"/>
-      </dgm:cxnLst>
-      <dgm:bg/>
-      <dgm:whole/>
-    </dgm:dataModel>
-  </dgm:clrData>
-  <dgm:layoutNode name="vert0">
-    <dgm:varLst>
-      <dgm:dir/>
-      <dgm:animOne val="branch"/>
-      <dgm:animLvl val="lvl"/>
-    </dgm:varLst>
-    <dgm:choose name="Name0">
-      <dgm:if name="Name1" func="var" arg="dir" op="equ" val="norm">
-        <dgm:alg type="lin">
-          <dgm:param type="linDir" val="fromT"/>
-          <dgm:param type="nodeHorzAlign" val="l"/>
-        </dgm:alg>
-      </dgm:if>
-      <dgm:else name="Name2">
-        <dgm:alg type="lin">
-          <dgm:param type="linDir" val="fromT"/>
-          <dgm:param type="nodeHorzAlign" val="r"/>
-        </dgm:alg>
-      </dgm:else>
-    </dgm:choose>
-    <dgm:shape xmlns:r="http://schemas.openxmlformats.org/officeDocument/2006/relationships" r:blip="">
-      <dgm:adjLst/>
-    </dgm:shape>
-    <dgm:presOf/>
-    <dgm:constrLst>
-      <dgm:constr type="w" for="ch" forName="horz1" refType="w"/>
-      <dgm:constr type="h" for="ch" forName="horz1" refType="h"/>
-      <dgm:constr type="h" for="des" forName="vert1" refType="h"/>
-      <dgm:constr type="h" for="des" forName="tx1" refType="h"/>
-      <dgm:constr type="h" for="des" forName="horz2" refType="h"/>
-      <dgm:constr type="h" for="des" forName="vert2" refType="h"/>
-      <dgm:constr type="h" for="des" forName="horz3" refType="h"/>
-      <dgm:constr type="h" for="des" forName="vert3" refType="h"/>
-      <dgm:constr type="h" for="des" forName="horz4" refType="h"/>
-      <dgm:constr type="h" for="des" ptType="node" refType="h"/>
-      <dgm:constr type="primFontSz" for="des" forName="tx1" op="equ" val="65"/>
-      <dgm:constr type="primFontSz" for="des" forName="tx2" op="equ" val="65"/>
-      <dgm:constr type="primFontSz" for="des" forName="tx3" op="equ" val="65"/>
-      <dgm:constr type="primFontSz" for="des" forName="tx4" op="equ" val="65"/>
-      <dgm:constr type="w" for="des" forName="thickLine" refType="w"/>
-      <dgm:constr type="h" for="des" forName="thickLine"/>
-      <dgm:constr type="h" for="des" forName="thinLine1"/>
-      <dgm:constr type="h" for="des" forName="thinLine2b"/>
-      <dgm:constr type="h" for="des" forName="thinLine3"/>
-      <dgm:constr type="h" for="des" forName="vertSpace2a" refType="h" fact="0.05"/>
-      <dgm:constr type="h" for="des" forName="vertSpace2b" refType="h" refFor="des" refForName="vertSpace2a"/>
-    </dgm:constrLst>
-    <dgm:forEach name="Name3" axis="ch" ptType="node">
-      <dgm:layoutNode name="thickLine" styleLbl="alignNode1">
-        <dgm:alg type="sp"/>
-        <dgm:shape xmlns:r="http://schemas.openxmlformats.org/officeDocument/2006/relationships" type="line" r:blip="">
-          <dgm:adjLst/>
-        </dgm:shape>
-        <dgm:presOf/>
-      </dgm:layoutNode>
-      <dgm:layoutNode name="horz1">
-        <dgm:choose name="Name4">
-          <dgm:if name="Name5" func="var" arg="dir" op="equ" val="norm">
-            <dgm:alg type="lin">
-              <dgm:param type="linDir" val="fromL"/>
-              <dgm:param type="nodeVertAlign" val="t"/>
-            </dgm:alg>
-          </dgm:if>
-          <dgm:else name="Name6">
-            <dgm:alg type="lin">
-              <dgm:param type="linDir" val="fromR"/>
-              <dgm:param type="nodeVertAlign" val="t"/>
-            </dgm:alg>
-          </dgm:else>
-        </dgm:choose>
-        <dgm:shape xmlns:r="http://schemas.openxmlformats.org/officeDocument/2006/relationships" r:blip="">
-          <dgm:adjLst/>
-        </dgm:shape>
-        <dgm:presOf/>
-        <dgm:choose name="Name7">
-          <dgm:if name="Name8" axis="root des" func="maxDepth" op="equ" val="1">
-            <dgm:constrLst>
-              <dgm:constr type="w" for="ch" forName="tx1" refType="w"/>
-            </dgm:constrLst>
-          </dgm:if>
-          <dgm:if name="Name9" axis="root des" func="maxDepth" op="equ" val="2">
-            <dgm:constrLst>
-              <dgm:constr type="w" for="ch" forName="tx1" refType="w" fact="0.2"/>
-              <dgm:constr type="w" for="des" forName="tx2" refType="w" fact="0.785"/>
-              <dgm:constr type="w" for="des" forName="horzSpace2" refType="w" fact="0.015"/>
-              <dgm:constr type="w" for="des" forName="thinLine2b" refType="w" fact="0.8"/>
-            </dgm:constrLst>
-          </dgm:if>
-          <dgm:if name="Name10" axis="root des" func="maxDepth" op="equ" val="3">
-            <dgm:constrLst>
-              <dgm:constr type="w" for="ch" forName="tx1" refType="w" fact="0.2"/>
-              <dgm:constr type="w" for="des" forName="tx2" refType="w" fact="0.385"/>
-              <dgm:constr type="w" for="des" forName="tx3" refType="w" fact="0.385"/>
-              <dgm:constr type="w" for="des" forName="horzSpace2" refType="w" fact="0.015"/>
-              <dgm:constr type="w" for="des" forName="horzSpace3" refType="w" fact="0.015"/>
-              <dgm:constr type="w" for="des" forName="thinLine2b" refType="w" fact="0.8"/>
-              <dgm:constr type="w" for="des" forName="thinLine3" refType="w" fact="0.385"/>
-            </dgm:constrLst>
-          </dgm:if>
-          <dgm:if name="Name11" axis="root des" func="maxDepth" op="gte" val="4">
-            <dgm:constrLst>
-              <dgm:constr type="w" for="ch" forName="tx1" refType="w" fact="0.2"/>
-              <dgm:constr type="w" for="des" forName="tx2" refType="w" fact="0.2516"/>
-              <dgm:constr type="w" for="des" forName="tx3" refType="w" fact="0.2516"/>
-              <dgm:constr type="w" for="des" forName="tx4" refType="w" fact="0.2516"/>
-              <dgm:constr type="w" for="des" forName="horzSpace2" refType="w" fact="0.015"/>
-              <dgm:constr type="w" for="des" forName="horzSpace3" refType="w" fact="0.015"/>
-              <dgm:constr type="w" for="des" forName="horzSpace4" refType="w" fact="0.015"/>
-              <dgm:constr type="w" for="des" forName="thinLine2b" refType="w" fact="0.8"/>
-              <dgm:constr type="w" for="des" forName="thinLine3" refType="w" fact="0.5332"/>
-            </dgm:constrLst>
-          </dgm:if>
-          <dgm:else name="Name12"/>
-        </dgm:choose>
-        <dgm:layoutNode name="tx1" styleLbl="revTx">
-          <dgm:alg type="tx">
-            <dgm:param type="parTxLTRAlign" val="l"/>
-            <dgm:param type="parTxRTLAlign" val="r"/>
-            <dgm:param type="txAnchorVert" val="t"/>
-          </dgm:alg>
-          <dgm:shape xmlns:r="http://schemas.openxmlformats.org/officeDocument/2006/relationships" type="rect" r:blip="">
-            <dgm:adjLst/>
-          </dgm:shape>
-          <dgm:presOf axis="self"/>
-          <dgm:constrLst>
-            <dgm:constr type="tMarg" refType="primFontSz" fact="0.3"/>
-            <dgm:constr type="bMarg" refType="primFontSz" fact="0.3"/>
-            <dgm:constr type="lMarg" refType="primFontSz" fact="0.3"/>
-            <dgm:constr type="rMarg" refType="primFontSz" fact="0.3"/>
-          </dgm:constrLst>
-          <dgm:ruleLst>
-            <dgm:rule type="primFontSz" val="5" fact="NaN" max="NaN"/>
-          </dgm:ruleLst>
-        </dgm:layoutNode>
-        <dgm:layoutNode name="vert1">
-          <dgm:choose name="Name13">
-            <dgm:if name="Name14" func="var" arg="dir" op="equ" val="norm">
-              <dgm:alg type="lin">
-                <dgm:param type="linDir" val="fromT"/>
-                <dgm:param type="nodeHorzAlign" val="l"/>
-              </dgm:alg>
-            </dgm:if>
-            <dgm:else name="Name15">
-              <dgm:alg type="lin">
-                <dgm:param type="linDir" val="fromT"/>
-                <dgm:param type="nodeHorzAlign" val="r"/>
-              </dgm:alg>
-            </dgm:else>
-          </dgm:choose>
-          <dgm:shape xmlns:r="http://schemas.openxmlformats.org/officeDocument/2006/relationships" r:blip="">
-            <dgm:adjLst/>
-          </dgm:shape>
-          <dgm:presOf/>
-          <dgm:forEach name="Name16" axis="ch" ptType="node">
-            <dgm:choose name="Name17">
-              <dgm:if name="Name18" axis="self" ptType="node" func="pos" op="equ" val="1">
-                <dgm:layoutNode name="vertSpace2a">
-                  <dgm:alg type="sp"/>
-                  <dgm:shape xmlns:r="http://schemas.openxmlformats.org/officeDocument/2006/relationships" r:blip="">
-                    <dgm:adjLst/>
-                  </dgm:shape>
-                  <dgm:presOf/>
-                </dgm:layoutNode>
-              </dgm:if>
-              <dgm:else name="Name19"/>
-            </dgm:choose>
-            <dgm:layoutNode name="horz2">
-              <dgm:choose name="Name20">
-                <dgm:if name="Name21" func="var" arg="dir" op="equ" val="norm">
-                  <dgm:alg type="lin">
-                    <dgm:param type="linDir" val="fromL"/>
-                    <dgm:param type="nodeVertAlign" val="t"/>
-                  </dgm:alg>
-                </dgm:if>
-                <dgm:else name="Name22">
-                  <dgm:alg type="lin">
-                    <dgm:param type="linDir" val="fromR"/>
-                    <dgm:param type="nodeVertAlign" val="t"/>
-                  </dgm:alg>
-                </dgm:else>
-              </dgm:choose>
-              <dgm:shape xmlns:r="http://schemas.openxmlformats.org/officeDocument/2006/relationships" r:blip="">
-                <dgm:adjLst/>
-              </dgm:shape>
-              <dgm:presOf/>
-              <dgm:layoutNode name="horzSpace2">
-                <dgm:alg type="sp"/>
-                <dgm:shape xmlns:r="http://schemas.openxmlformats.org/officeDocument/2006/relationships" r:blip="">
-                  <dgm:adjLst/>
-                </dgm:shape>
-                <dgm:presOf/>
-              </dgm:layoutNode>
-              <dgm:layoutNode name="tx2" styleLbl="revTx">
-                <dgm:alg type="tx">
-                  <dgm:param type="parTxLTRAlign" val="l"/>
-                  <dgm:param type="parTxRTLAlign" val="r"/>
-                  <dgm:param type="txAnchorVert" val="t"/>
-                </dgm:alg>
-                <dgm:shape xmlns:r="http://schemas.openxmlformats.org/officeDocument/2006/relationships" type="rect" r:blip="">
-                  <dgm:adjLst/>
-                </dgm:shape>
-                <dgm:presOf axis="self"/>
-                <dgm:constrLst>
-                  <dgm:constr type="tMarg" refType="primFontSz" fact="0.3"/>
-                  <dgm:constr type="bMarg" refType="primFontSz" fact="0.3"/>
-                  <dgm:constr type="lMarg" refType="primFontSz" fact="0.3"/>
-                  <dgm:constr type="rMarg" refType="primFontSz" fact="0.3"/>
-                </dgm:constrLst>
-                <dgm:ruleLst>
-                  <dgm:rule type="primFontSz" val="5" fact="NaN" max="NaN"/>
-                </dgm:ruleLst>
-              </dgm:layoutNode>
-              <dgm:layoutNode name="vert2">
-                <dgm:choose name="Name23">
-                  <dgm:if name="Name24" func="var" arg="dir" op="equ" val="norm">
-                    <dgm:alg type="lin">
-                      <dgm:param type="linDir" val="fromT"/>
-                      <dgm:param type="nodeHorzAlign" val="l"/>
-                    </dgm:alg>
-                  </dgm:if>
-                  <dgm:else name="Name25">
-                    <dgm:alg type="lin">
-                      <dgm:param type="linDir" val="fromT"/>
-                      <dgm:param type="nodeHorzAlign" val="r"/>
-                    </dgm:alg>
-                  </dgm:else>
-                </dgm:choose>
-                <dgm:shape xmlns:r="http://schemas.openxmlformats.org/officeDocument/2006/relationships" r:blip="">
-                  <dgm:adjLst/>
-                </dgm:shape>
-                <dgm:presOf/>
-                <dgm:forEach name="Name26" axis="ch" ptType="node">
-                  <dgm:layoutNode name="horz3">
-                    <dgm:choose name="Name27">
-                      <dgm:if name="Name28" func="var" arg="dir" op="equ" val="norm">
-                        <dgm:alg type="lin">
-                          <dgm:param type="linDir" val="fromL"/>
-                          <dgm:param type="nodeVertAlign" val="t"/>
-                        </dgm:alg>
-                      </dgm:if>
-                      <dgm:else name="Name29">
-                        <dgm:alg type="lin">
-                          <dgm:param type="linDir" val="fromR"/>
-                          <dgm:param type="nodeVertAlign" val="t"/>
-                        </dgm:alg>
-                      </dgm:else>
-                    </dgm:choose>
-                    <dgm:shape xmlns:r="http://schemas.openxmlformats.org/officeDocument/2006/relationships" r:blip="">
-                      <dgm:adjLst/>
-                    </dgm:shape>
-                    <dgm:presOf/>
-                    <dgm:layoutNode name="horzSpace3">
-                      <dgm:alg type="sp"/>
-                      <dgm:shape xmlns:r="http://schemas.openxmlformats.org/officeDocument/2006/relationships" r:blip="">
-                        <dgm:adjLst/>
-                      </dgm:shape>
-                      <dgm:presOf/>
-                    </dgm:layoutNode>
-                    <dgm:layoutNode name="tx3" styleLbl="revTx">
-                      <dgm:alg type="tx">
-                        <dgm:param type="parTxLTRAlign" val="l"/>
-                        <dgm:param type="parTxRTLAlign" val="r"/>
-                        <dgm:param type="txAnchorVert" val="t"/>
-                      </dgm:alg>
-                      <dgm:shape xmlns:r="http://schemas.openxmlformats.org/officeDocument/2006/relationships" type="rect" r:blip="">
-                        <dgm:adjLst/>
-                      </dgm:shape>
-                      <dgm:presOf axis="self"/>
-                      <dgm:constrLst>
-                        <dgm:constr type="tMarg" refType="primFontSz" fact="0.3"/>
-                        <dgm:constr type="bMarg" refType="primFontSz" fact="0.3"/>
-                        <dgm:constr type="lMarg" refType="primFontSz" fact="0.3"/>
-                        <dgm:constr type="rMarg" refType="primFontSz" fact="0.3"/>
-                      </dgm:constrLst>
-                      <dgm:ruleLst>
-                        <dgm:rule type="primFontSz" val="5" fact="NaN" max="NaN"/>
-                      </dgm:ruleLst>
-                    </dgm:layoutNode>
-                    <dgm:layoutNode name="vert3">
-                      <dgm:choose name="Name30">
-                        <dgm:if name="Name31" func="var" arg="dir" op="equ" val="norm">
-                          <dgm:alg type="lin">
-                            <dgm:param type="linDir" val="fromT"/>
-                            <dgm:param type="nodeHorzAlign" val="l"/>
-                          </dgm:alg>
-                        </dgm:if>
-                        <dgm:else name="Name32">
-                          <dgm:alg type="lin">
-                            <dgm:param type="linDir" val="fromT"/>
-                            <dgm:param type="nodeHorzAlign" val="r"/>
-                          </dgm:alg>
-                        </dgm:else>
-                      </dgm:choose>
-                      <dgm:shape xmlns:r="http://schemas.openxmlformats.org/officeDocument/2006/relationships" r:blip="">
-                        <dgm:adjLst/>
-                      </dgm:shape>
-                      <dgm:presOf/>
-                      <dgm:forEach name="Name33" axis="ch" ptType="node">
-                        <dgm:layoutNode name="horz4">
-                          <dgm:choose name="Name34">
-                            <dgm:if name="Name35" func="var" arg="dir" op="equ" val="norm">
-                              <dgm:alg type="lin">
-                                <dgm:param type="linDir" val="fromL"/>
-                                <dgm:param type="nodeVertAlign" val="t"/>
-                              </dgm:alg>
-                            </dgm:if>
-                            <dgm:else name="Name36">
-                              <dgm:alg type="lin">
-                                <dgm:param type="linDir" val="fromR"/>
-                                <dgm:param type="nodeVertAlign" val="t"/>
-                              </dgm:alg>
-                            </dgm:else>
-                          </dgm:choose>
-                          <dgm:shape xmlns:r="http://schemas.openxmlformats.org/officeDocument/2006/relationships" r:blip="">
-                            <dgm:adjLst/>
-                          </dgm:shape>
-                          <dgm:presOf/>
-                          <dgm:layoutNode name="horzSpace4">
-                            <dgm:alg type="sp"/>
-                            <dgm:shape xmlns:r="http://schemas.openxmlformats.org/officeDocument/2006/relationships" r:blip="">
-                              <dgm:adjLst/>
-                            </dgm:shape>
-                            <dgm:presOf/>
-                          </dgm:layoutNode>
-                          <dgm:layoutNode name="tx4" styleLbl="revTx">
-                            <dgm:varLst>
-                              <dgm:bulletEnabled val="1"/>
-                            </dgm:varLst>
-                            <dgm:alg type="tx">
-                              <dgm:param type="parTxLTRAlign" val="l"/>
-                              <dgm:param type="parTxRTLAlign" val="r"/>
-                              <dgm:param type="txAnchorVert" val="t"/>
-                            </dgm:alg>
-                            <dgm:shape xmlns:r="http://schemas.openxmlformats.org/officeDocument/2006/relationships" type="rect" r:blip="">
-                              <dgm:adjLst/>
-                            </dgm:shape>
-                            <dgm:presOf axis="desOrSelf" ptType="node"/>
-                            <dgm:constrLst>
-                              <dgm:constr type="tMarg" refType="primFontSz" fact="0.3"/>
-                              <dgm:constr type="bMarg" refType="primFontSz" fact="0.3"/>
-                              <dgm:constr type="lMarg" refType="primFontSz" fact="0.3"/>
-                              <dgm:constr type="rMarg" refType="primFontSz" fact="0.3"/>
-                            </dgm:constrLst>
-                            <dgm:ruleLst>
-                              <dgm:rule type="primFontSz" val="5" fact="NaN" max="NaN"/>
-                            </dgm:ruleLst>
-                          </dgm:layoutNode>
-                        </dgm:layoutNode>
-                      </dgm:forEach>
-                    </dgm:layoutNode>
-                  </dgm:layoutNode>
-                  <dgm:forEach name="Name37" axis="followSib" ptType="sibTrans" cnt="1">
-                    <dgm:layoutNode name="thinLine3" styleLbl="callout">
-                      <dgm:alg type="sp"/>
-                      <dgm:shape xmlns:r="http://schemas.openxmlformats.org/officeDocument/2006/relationships" type="line" r:blip="">
-                        <dgm:adjLst/>
-                      </dgm:shape>
-                      <dgm:presOf/>
-                    </dgm:layoutNode>
-                  </dgm:forEach>
-                </dgm:forEach>
-              </dgm:layoutNode>
-            </dgm:layoutNode>
-            <dgm:layoutNode name="thinLine2b" styleLbl="callout">
-              <dgm:alg type="sp"/>
-              <dgm:shape xmlns:r="http://schemas.openxmlformats.org/officeDocument/2006/relationships" type="line" r:blip="">
-                <dgm:adjLst/>
-              </dgm:shape>
-              <dgm:presOf/>
-            </dgm:layoutNode>
-            <dgm:layoutNode name="vertSpace2b">
-              <dgm:alg type="sp"/>
-              <dgm:shape xmlns:r="http://schemas.openxmlformats.org/officeDocument/2006/relationships" r:blip="">
-                <dgm:adjLst/>
-              </dgm:shape>
-              <dgm:presOf/>
-            </dgm:layoutNode>
-          </dgm:forEach>
-        </dgm:layoutNode>
-      </dgm:layoutNode>
-    </dgm:forEach>
-  </dgm:layoutNode>
-</dgm:layoutDef>
-</file>
-
-<file path=ppt/diagrams/quickStyle1.xml><?xml version="1.0" encoding="utf-8"?>
-<dgm:styleDef xmlns:dgm="http://schemas.openxmlformats.org/drawingml/2006/diagram" xmlns:a="http://schemas.openxmlformats.org/drawingml/2006/main" uniqueId="urn:microsoft.com/office/officeart/2005/8/quickstyle/simple4">
-  <dgm:title val=""/>
-  <dgm:desc val=""/>
-  <dgm:catLst>
-    <dgm:cat type="simple" pri="10400"/>
-  </dgm:catLst>
-  <dgm:scene3d>
-    <a:camera prst="orthographicFront"/>
-    <a:lightRig rig="threePt" dir="t"/>
-  </dgm:scene3d>
-  <dgm:styleLbl name="node0">
-    <dgm:scene3d>
-      <a:camera prst="orthographicFront"/>
-      <a:lightRig rig="threePt" dir="t"/>
-    </dgm:scene3d>
-    <dgm:sp3d/>
-    <dgm:txPr/>
-    <dgm:style>
-      <a:lnRef idx="0">
-        <a:scrgbClr r="0" g="0" b="0"/>
-      </a:lnRef>
-      <a:fillRef idx="3">
-        <a:scrgbClr r="0" g="0" b="0"/>
-      </a:fillRef>
-      <a:effectRef idx="2">
-        <a:scrgbClr r="0" g="0" b="0"/>
-      </a:effectRef>
-      <a:fontRef idx="minor">
-        <a:schemeClr val="lt1"/>
-      </a:fontRef>
-    </dgm:style>
-  </dgm:styleLbl>
-  <dgm:styleLbl name="lnNode1">
-    <dgm:scene3d>
-      <a:camera prst="orthographicFront"/>
-      <a:lightRig rig="threePt" dir="t"/>
-    </dgm:scene3d>
-    <dgm:sp3d/>
-    <dgm:txPr/>
-    <dgm:style>
-      <a:lnRef idx="1">
-        <a:scrgbClr r="0" g="0" b="0"/>
-      </a:lnRef>
-      <a:fillRef idx="3">
-        <a:scrgbClr r="0" g="0" b="0"/>
-      </a:fillRef>
-      <a:effectRef idx="2">
-        <a:scrgbClr r="0" g="0" b="0"/>
-      </a:effectRef>
-      <a:fontRef idx="minor">
-        <a:schemeClr val="lt1"/>
-      </a:fontRef>
-    </dgm:style>
-  </dgm:styleLbl>
-  <dgm:styleLbl name="vennNode1">
-    <dgm:scene3d>
-      <a:camera prst="orthographicFront"/>
-      <a:lightRig rig="threePt" dir="t"/>
-    </dgm:scene3d>
-    <dgm:sp3d/>
-    <dgm:txPr/>
-    <dgm:style>
-      <a:lnRef idx="0">
-        <a:scrgbClr r="0" g="0" b="0"/>
-      </a:lnRef>
-      <a:fillRef idx="3">
-        <a:scrgbClr r="0" g="0" b="0"/>
-      </a:fillRef>
-      <a:effectRef idx="0">
-        <a:scrgbClr r="0" g="0" b="0"/>
-      </a:effectRef>
-      <a:fontRef idx="minor">
-        <a:schemeClr val="tx1"/>
-      </a:fontRef>
-    </dgm:style>
-  </dgm:styleLbl>
-  <dgm:styleLbl name="alignNode1">
-    <dgm:scene3d>
-      <a:camera prst="orthographicFront"/>
-      <a:lightRig rig="threePt" dir="t"/>
-    </dgm:scene3d>
-    <dgm:sp3d/>
-    <dgm:txPr/>
-    <dgm:style>
-      <a:lnRef idx="1">
-        <a:scrgbClr r="0" g="0" b="0"/>
-      </a:lnRef>
-      <a:fillRef idx="3">
-        <a:scrgbClr r="0" g="0" b="0"/>
-      </a:fillRef>
-      <a:effectRef idx="2">
-        <a:scrgbClr r="0" g="0" b="0"/>
-      </a:effectRef>
-      <a:fontRef idx="minor">
-        <a:schemeClr val="lt1"/>
-      </a:fontRef>
-    </dgm:style>
-  </dgm:styleLbl>
-  <dgm:styleLbl name="node1">
-    <dgm:scene3d>
-      <a:camera prst="orthographicFront"/>
-      <a:lightRig rig="threePt" dir="t"/>
-    </dgm:scene3d>
-    <dgm:sp3d/>
-    <dgm:txPr/>
-    <dgm:style>
-      <a:lnRef idx="0">
-        <a:scrgbClr r="0" g="0" b="0"/>
-      </a:lnRef>
-      <a:fillRef idx="3">
-        <a:scrgbClr r="0" g="0" b="0"/>
-      </a:fillRef>
-      <a:effectRef idx="2">
-        <a:scrgbClr r="0" g="0" b="0"/>
-      </a:effectRef>
-      <a:fontRef idx="minor">
-        <a:schemeClr val="lt1"/>
-      </a:fontRef>
-    </dgm:style>
-  </dgm:styleLbl>
-  <dgm:styleLbl name="node2">
-    <dgm:scene3d>
-      <a:camera prst="orthographicFront"/>
-      <a:lightRig rig="threePt" dir="t"/>
-    </dgm:scene3d>
-    <dgm:sp3d/>
-    <dgm:txPr/>
-    <dgm:style>
-      <a:lnRef idx="0">
-        <a:scrgbClr r="0" g="0" b="0"/>
-      </a:lnRef>
-      <a:fillRef idx="3">
-        <a:scrgbClr r="0" g="0" b="0"/>
-      </a:fillRef>
-      <a:effectRef idx="2">
-        <a:scrgbClr r="0" g="0" b="0"/>
-      </a:effectRef>
-      <a:fontRef idx="minor">
-        <a:schemeClr val="lt1"/>
-      </a:fontRef>
-    </dgm:style>
-  </dgm:styleLbl>
-  <dgm:styleLbl name="node3">
-    <dgm:scene3d>
-      <a:camera prst="orthographicFront"/>
-      <a:lightRig rig="threePt" dir="t"/>
-    </dgm:scene3d>
-    <dgm:sp3d/>
-    <dgm:txPr/>
-    <dgm:style>
-      <a:lnRef idx="0">
-        <a:scrgbClr r="0" g="0" b="0"/>
-      </a:lnRef>
-      <a:fillRef idx="3">
-        <a:scrgbClr r="0" g="0" b="0"/>
-      </a:fillRef>
-      <a:effectRef idx="2">
-        <a:scrgbClr r="0" g="0" b="0"/>
-      </a:effectRef>
-      <a:fontRef idx="minor">
-        <a:schemeClr val="lt1"/>
-      </a:fontRef>
-    </dgm:style>
-  </dgm:styleLbl>
-  <dgm:styleLbl name="node4">
-    <dgm:scene3d>
-      <a:camera prst="orthographicFront"/>
-      <a:lightRig rig="threePt" dir="t"/>
-    </dgm:scene3d>
-    <dgm:sp3d/>
-    <dgm:txPr/>
-    <dgm:style>
-      <a:lnRef idx="0">
-        <a:scrgbClr r="0" g="0" b="0"/>
-      </a:lnRef>
-      <a:fillRef idx="3">
-        <a:scrgbClr r="0" g="0" b="0"/>
-      </a:fillRef>
-      <a:effectRef idx="2">
-        <a:scrgbClr r="0" g="0" b="0"/>
-      </a:effectRef>
-      <a:fontRef idx="minor">
-        <a:schemeClr val="lt1"/>
-      </a:fontRef>
-    </dgm:style>
-  </dgm:styleLbl>
-  <dgm:styleLbl name="fgImgPlace1">
-    <dgm:scene3d>
-      <a:camera prst="orthographicFront"/>
-      <a:lightRig rig="threePt" dir="t"/>
-    </dgm:scene3d>
-    <dgm:sp3d/>
-    <dgm:txPr/>
-    <dgm:style>
-      <a:lnRef idx="0">
-        <a:scrgbClr r="0" g="0" b="0"/>
-      </a:lnRef>
-      <a:fillRef idx="1">
-        <a:scrgbClr r="0" g="0" b="0"/>
-      </a:fillRef>
-      <a:effectRef idx="2">
-        <a:scrgbClr r="0" g="0" b="0"/>
-      </a:effectRef>
-      <a:fontRef idx="minor"/>
-    </dgm:style>
-  </dgm:styleLbl>
-  <dgm:styleLbl name="alignImgPlace1">
-    <dgm:scene3d>
-      <a:camera prst="orthographicFront"/>
-      <a:lightRig rig="threePt" dir="t"/>
-    </dgm:scene3d>
-    <dgm:sp3d/>
-    <dgm:txPr/>
-    <dgm:style>
-      <a:lnRef idx="0">
-        <a:scrgbClr r="0" g="0" b="0"/>
-      </a:lnRef>
-      <a:fillRef idx="1">
-        <a:scrgbClr r="0" g="0" b="0"/>
-      </a:fillRef>
-      <a:effectRef idx="2">
-        <a:scrgbClr r="0" g="0" b="0"/>
-      </a:effectRef>
-      <a:fontRef idx="minor"/>
-    </dgm:style>
-  </dgm:styleLbl>
-  <dgm:styleLbl name="bgImgPlace1">
-    <dgm:scene3d>
-      <a:camera prst="orthographicFront"/>
-      <a:lightRig rig="threePt" dir="t"/>
-    </dgm:scene3d>
-    <dgm:sp3d/>
-    <dgm:txPr/>
-    <dgm:style>
-      <a:lnRef idx="0">
-        <a:scrgbClr r="0" g="0" b="0"/>
-      </a:lnRef>
-      <a:fillRef idx="1">
-        <a:scrgbClr r="0" g="0" b="0"/>
-      </a:fillRef>
-      <a:effectRef idx="2">
-        <a:scrgbClr r="0" g="0" b="0"/>
-      </a:effectRef>
-      <a:fontRef idx="minor"/>
-    </dgm:style>
-  </dgm:styleLbl>
-  <dgm:styleLbl name="sibTrans2D1">
-    <dgm:scene3d>
-      <a:camera prst="orthographicFront"/>
-      <a:lightRig rig="threePt" dir="t"/>
-    </dgm:scene3d>
-    <dgm:sp3d/>
-    <dgm:txPr/>
-    <dgm:style>
-      <a:lnRef idx="0">
-        <a:scrgbClr r="0" g="0" b="0"/>
-      </a:lnRef>
-      <a:fillRef idx="3">
-        <a:scrgbClr r="0" g="0" b="0"/>
-      </a:fillRef>
-      <a:effectRef idx="2">
-        <a:scrgbClr r="0" g="0" b="0"/>
-      </a:effectRef>
-      <a:fontRef idx="minor">
-        <a:schemeClr val="lt1"/>
-      </a:fontRef>
-    </dgm:style>
-  </dgm:styleLbl>
-  <dgm:styleLbl name="fgSibTrans2D1">
-    <dgm:scene3d>
-      <a:camera prst="orthographicFront"/>
-      <a:lightRig rig="threePt" dir="t"/>
-    </dgm:scene3d>
-    <dgm:sp3d/>
-    <dgm:txPr/>
-    <dgm:style>
-      <a:lnRef idx="0">
-        <a:scrgbClr r="0" g="0" b="0"/>
-      </a:lnRef>
-      <a:fillRef idx="3">
-        <a:scrgbClr r="0" g="0" b="0"/>
-      </a:fillRef>
-      <a:effectRef idx="2">
-        <a:scrgbClr r="0" g="0" b="0"/>
-      </a:effectRef>
-      <a:fontRef idx="minor">
-        <a:schemeClr val="lt1"/>
-      </a:fontRef>
-    </dgm:style>
-  </dgm:styleLbl>
-  <dgm:styleLbl name="bgSibTrans2D1">
-    <dgm:scene3d>
-      <a:camera prst="orthographicFront"/>
-      <a:lightRig rig="threePt" dir="t"/>
-    </dgm:scene3d>
-    <dgm:sp3d/>
-    <dgm:txPr/>
-    <dgm:style>
-      <a:lnRef idx="0">
-        <a:scrgbClr r="0" g="0" b="0"/>
-      </a:lnRef>
-      <a:fillRef idx="3">
-        <a:scrgbClr r="0" g="0" b="0"/>
-      </a:fillRef>
-      <a:effectRef idx="2">
-        <a:scrgbClr r="0" g="0" b="0"/>
-      </a:effectRef>
-      <a:fontRef idx="minor">
-        <a:schemeClr val="lt1"/>
-      </a:fontRef>
-    </dgm:style>
-  </dgm:styleLbl>
-  <dgm:styleLbl name="sibTrans1D1">
-    <dgm:scene3d>
-      <a:camera prst="orthographicFront"/>
-      <a:lightRig rig="threePt" dir="t"/>
-    </dgm:scene3d>
-    <dgm:sp3d/>
-    <dgm:txPr/>
-    <dgm:style>
-      <a:lnRef idx="1">
-        <a:scrgbClr r="0" g="0" b="0"/>
-      </a:lnRef>
-      <a:fillRef idx="0">
-        <a:scrgbClr r="0" g="0" b="0"/>
-      </a:fillRef>
-      <a:effectRef idx="0">
-        <a:scrgbClr r="0" g="0" b="0"/>
-      </a:effectRef>
-      <a:fontRef idx="minor"/>
-    </dgm:style>
-  </dgm:styleLbl>
-  <dgm:styleLbl name="callout">
-    <dgm:scene3d>
-      <a:camera prst="orthographicFront"/>
-      <a:lightRig rig="threePt" dir="t"/>
-    </dgm:scene3d>
-    <dgm:sp3d/>
-    <dgm:txPr/>
-    <dgm:style>
-      <a:lnRef idx="2">
-        <a:scrgbClr r="0" g="0" b="0"/>
-      </a:lnRef>
-      <a:fillRef idx="1">
-        <a:scrgbClr r="0" g="0" b="0"/>
-      </a:fillRef>
-      <a:effectRef idx="1">
-        <a:scrgbClr r="0" g="0" b="0"/>
-      </a:effectRef>
-      <a:fontRef idx="minor"/>
-    </dgm:style>
-  </dgm:styleLbl>
-  <dgm:styleLbl name="asst0">
-    <dgm:scene3d>
-      <a:camera prst="orthographicFront"/>
-      <a:lightRig rig="threePt" dir="t"/>
-    </dgm:scene3d>
-    <dgm:sp3d/>
-    <dgm:txPr/>
-    <dgm:style>
-      <a:lnRef idx="0">
-        <a:scrgbClr r="0" g="0" b="0"/>
-      </a:lnRef>
-      <a:fillRef idx="3">
-        <a:scrgbClr r="0" g="0" b="0"/>
-      </a:fillRef>
-      <a:effectRef idx="2">
-        <a:scrgbClr r="0" g="0" b="0"/>
-      </a:effectRef>
-      <a:fontRef idx="minor">
-        <a:schemeClr val="lt1"/>
-      </a:fontRef>
-    </dgm:style>
-  </dgm:styleLbl>
-  <dgm:styleLbl name="asst1">
-    <dgm:scene3d>
-      <a:camera prst="orthographicFront"/>
-      <a:lightRig rig="threePt" dir="t"/>
-    </dgm:scene3d>
-    <dgm:sp3d/>
-    <dgm:txPr/>
-    <dgm:style>
-      <a:lnRef idx="0">
-        <a:scrgbClr r="0" g="0" b="0"/>
-      </a:lnRef>
-      <a:fillRef idx="3">
-        <a:scrgbClr r="0" g="0" b="0"/>
-      </a:fillRef>
-      <a:effectRef idx="2">
-        <a:scrgbClr r="0" g="0" b="0"/>
-      </a:effectRef>
-      <a:fontRef idx="minor">
-        <a:schemeClr val="lt1"/>
-      </a:fontRef>
-    </dgm:style>
-  </dgm:styleLbl>
-  <dgm:styleLbl name="asst2">
-    <dgm:scene3d>
-      <a:camera prst="orthographicFront"/>
-      <a:lightRig rig="threePt" dir="t"/>
-    </dgm:scene3d>
-    <dgm:sp3d/>
-    <dgm:txPr/>
-    <dgm:style>
-      <a:lnRef idx="0">
-        <a:scrgbClr r="0" g="0" b="0"/>
-      </a:lnRef>
-      <a:fillRef idx="3">
-        <a:scrgbClr r="0" g="0" b="0"/>
-      </a:fillRef>
-      <a:effectRef idx="2">
-        <a:scrgbClr r="0" g="0" b="0"/>
-      </a:effectRef>
-      <a:fontRef idx="minor">
-        <a:schemeClr val="lt1"/>
-      </a:fontRef>
-    </dgm:style>
-  </dgm:styleLbl>
-  <dgm:styleLbl name="asst3">
-    <dgm:scene3d>
-      <a:camera prst="orthographicFront"/>
-      <a:lightRig rig="threePt" dir="t"/>
-    </dgm:scene3d>
-    <dgm:sp3d/>
-    <dgm:txPr/>
-    <dgm:style>
-      <a:lnRef idx="0">
-        <a:scrgbClr r="0" g="0" b="0"/>
-      </a:lnRef>
-      <a:fillRef idx="3">
-        <a:scrgbClr r="0" g="0" b="0"/>
-      </a:fillRef>
-      <a:effectRef idx="2">
-        <a:scrgbClr r="0" g="0" b="0"/>
-      </a:effectRef>
-      <a:fontRef idx="minor">
-        <a:schemeClr val="lt1"/>
-      </a:fontRef>
-    </dgm:style>
-  </dgm:styleLbl>
-  <dgm:styleLbl name="asst4">
-    <dgm:scene3d>
-      <a:camera prst="orthographicFront"/>
-      <a:lightRig rig="threePt" dir="t"/>
-    </dgm:scene3d>
-    <dgm:sp3d/>
-    <dgm:txPr/>
-    <dgm:style>
-      <a:lnRef idx="0">
-        <a:scrgbClr r="0" g="0" b="0"/>
-      </a:lnRef>
-      <a:fillRef idx="3">
-        <a:scrgbClr r="0" g="0" b="0"/>
-      </a:fillRef>
-      <a:effectRef idx="2">
-        <a:scrgbClr r="0" g="0" b="0"/>
-      </a:effectRef>
-      <a:fontRef idx="minor">
-        <a:schemeClr val="lt1"/>
-      </a:fontRef>
-    </dgm:style>
-  </dgm:styleLbl>
-  <dgm:styleLbl name="parChTrans2D1">
-    <dgm:scene3d>
-      <a:camera prst="orthographicFront"/>
-      <a:lightRig rig="threePt" dir="t"/>
-    </dgm:scene3d>
-    <dgm:sp3d/>
-    <dgm:txPr/>
-    <dgm:style>
-      <a:lnRef idx="0">
-        <a:scrgbClr r="0" g="0" b="0"/>
-      </a:lnRef>
-      <a:fillRef idx="3">
-        <a:scrgbClr r="0" g="0" b="0"/>
-      </a:fillRef>
-      <a:effectRef idx="2">
-        <a:scrgbClr r="0" g="0" b="0"/>
-      </a:effectRef>
-      <a:fontRef idx="minor">
-        <a:schemeClr val="lt1"/>
-      </a:fontRef>
-    </dgm:style>
-  </dgm:styleLbl>
-  <dgm:styleLbl name="parChTrans2D2">
-    <dgm:scene3d>
-      <a:camera prst="orthographicFront"/>
-      <a:lightRig rig="threePt" dir="t"/>
-    </dgm:scene3d>
-    <dgm:sp3d/>
-    <dgm:txPr/>
-    <dgm:style>
-      <a:lnRef idx="0">
-        <a:scrgbClr r="0" g="0" b="0"/>
-      </a:lnRef>
-      <a:fillRef idx="3">
-        <a:scrgbClr r="0" g="0" b="0"/>
-      </a:fillRef>
-      <a:effectRef idx="2">
-        <a:scrgbClr r="0" g="0" b="0"/>
-      </a:effectRef>
-      <a:fontRef idx="minor">
-        <a:schemeClr val="lt1"/>
-      </a:fontRef>
-    </dgm:style>
-  </dgm:styleLbl>
-  <dgm:styleLbl name="parChTrans2D3">
-    <dgm:scene3d>
-      <a:camera prst="orthographicFront"/>
-      <a:lightRig rig="threePt" dir="t"/>
-    </dgm:scene3d>
-    <dgm:sp3d/>
-    <dgm:txPr/>
-    <dgm:style>
-      <a:lnRef idx="1">
-        <a:scrgbClr r="0" g="0" b="0"/>
-      </a:lnRef>
-      <a:fillRef idx="3">
-        <a:scrgbClr r="0" g="0" b="0"/>
-      </a:fillRef>
-      <a:effectRef idx="2">
-        <a:scrgbClr r="0" g="0" b="0"/>
-      </a:effectRef>
-      <a:fontRef idx="minor">
-        <a:schemeClr val="lt1"/>
-      </a:fontRef>
-    </dgm:style>
-  </dgm:styleLbl>
-  <dgm:styleLbl name="parChTrans2D4">
-    <dgm:scene3d>
-      <a:camera prst="orthographicFront"/>
-      <a:lightRig rig="threePt" dir="t"/>
-    </dgm:scene3d>
-    <dgm:sp3d/>
-    <dgm:txPr/>
-    <dgm:style>
-      <a:lnRef idx="1">
-        <a:scrgbClr r="0" g="0" b="0"/>
-      </a:lnRef>
-      <a:fillRef idx="3">
-        <a:scrgbClr r="0" g="0" b="0"/>
-      </a:fillRef>
-      <a:effectRef idx="2">
-        <a:scrgbClr r="0" g="0" b="0"/>
-      </a:effectRef>
-      <a:fontRef idx="minor">
-        <a:schemeClr val="lt1"/>
-      </a:fontRef>
-    </dgm:style>
-  </dgm:styleLbl>
-  <dgm:styleLbl name="parChTrans1D1">
-    <dgm:scene3d>
-      <a:camera prst="orthographicFront"/>
-      <a:lightRig rig="threePt" dir="t"/>
-    </dgm:scene3d>
-    <dgm:sp3d/>
-    <dgm:txPr/>
-    <dgm:style>
-      <a:lnRef idx="1">
-        <a:scrgbClr r="0" g="0" b="0"/>
-      </a:lnRef>
-      <a:fillRef idx="0">
-        <a:scrgbClr r="0" g="0" b="0"/>
-      </a:fillRef>
-      <a:effectRef idx="0">
-        <a:scrgbClr r="0" g="0" b="0"/>
-      </a:effectRef>
-      <a:fontRef idx="minor"/>
-    </dgm:style>
-  </dgm:styleLbl>
-  <dgm:styleLbl name="parChTrans1D2">
-    <dgm:scene3d>
-      <a:camera prst="orthographicFront"/>
-      <a:lightRig rig="threePt" dir="t"/>
-    </dgm:scene3d>
-    <dgm:sp3d/>
-    <dgm:txPr/>
-    <dgm:style>
-      <a:lnRef idx="1">
-        <a:scrgbClr r="0" g="0" b="0"/>
-      </a:lnRef>
-      <a:fillRef idx="0">
-        <a:scrgbClr r="0" g="0" b="0"/>
-      </a:fillRef>
-      <a:effectRef idx="0">
-        <a:scrgbClr r="0" g="0" b="0"/>
-      </a:effectRef>
-      <a:fontRef idx="minor"/>
-    </dgm:style>
-  </dgm:styleLbl>
-  <dgm:styleLbl name="parChTrans1D3">
-    <dgm:scene3d>
-      <a:camera prst="orthographicFront"/>
-      <a:lightRig rig="threePt" dir="t"/>
-    </dgm:scene3d>
-    <dgm:sp3d/>
-    <dgm:txPr/>
-    <dgm:style>
-      <a:lnRef idx="1">
-        <a:scrgbClr r="0" g="0" b="0"/>
-      </a:lnRef>
-      <a:fillRef idx="0">
-        <a:scrgbClr r="0" g="0" b="0"/>
-      </a:fillRef>
-      <a:effectRef idx="0">
-        <a:scrgbClr r="0" g="0" b="0"/>
-      </a:effectRef>
-      <a:fontRef idx="minor"/>
-    </dgm:style>
-  </dgm:styleLbl>
-  <dgm:styleLbl name="parChTrans1D4">
-    <dgm:scene3d>
-      <a:camera prst="orthographicFront"/>
-      <a:lightRig rig="threePt" dir="t"/>
-    </dgm:scene3d>
-    <dgm:sp3d/>
-    <dgm:txPr/>
-    <dgm:style>
-      <a:lnRef idx="1">
-        <a:scrgbClr r="0" g="0" b="0"/>
-      </a:lnRef>
-      <a:fillRef idx="0">
-        <a:scrgbClr r="0" g="0" b="0"/>
-      </a:fillRef>
-      <a:effectRef idx="0">
-        <a:scrgbClr r="0" g="0" b="0"/>
-      </a:effectRef>
-      <a:fontRef idx="minor"/>
-    </dgm:style>
-  </dgm:styleLbl>
-  <dgm:styleLbl name="fgAcc1">
-    <dgm:scene3d>
-      <a:camera prst="orthographicFront"/>
-      <a:lightRig rig="threePt" dir="t"/>
-    </dgm:scene3d>
-    <dgm:sp3d/>
-    <dgm:txPr/>
-    <dgm:style>
-      <a:lnRef idx="1">
-        <a:scrgbClr r="0" g="0" b="0"/>
-      </a:lnRef>
-      <a:fillRef idx="1">
-        <a:scrgbClr r="0" g="0" b="0"/>
-      </a:fillRef>
-      <a:effectRef idx="0">
-        <a:scrgbClr r="0" g="0" b="0"/>
-      </a:effectRef>
-      <a:fontRef idx="minor"/>
-    </dgm:style>
-  </dgm:styleLbl>
-  <dgm:styleLbl name="conFgAcc1">
-    <dgm:scene3d>
-      <a:camera prst="orthographicFront"/>
-      <a:lightRig rig="threePt" dir="t"/>
-    </dgm:scene3d>
-    <dgm:sp3d/>
-    <dgm:txPr/>
-    <dgm:style>
-      <a:lnRef idx="1">
-        <a:scrgbClr r="0" g="0" b="0"/>
-      </a:lnRef>
-      <a:fillRef idx="1">
-        <a:scrgbClr r="0" g="0" b="0"/>
-      </a:fillRef>
-      <a:effectRef idx="0">
-        <a:scrgbClr r="0" g="0" b="0"/>
-      </a:effectRef>
-      <a:fontRef idx="minor"/>
-    </dgm:style>
-  </dgm:styleLbl>
-  <dgm:styleLbl name="alignAcc1">
-    <dgm:scene3d>
-      <a:camera prst="orthographicFront"/>
-      <a:lightRig rig="threePt" dir="t"/>
-    </dgm:scene3d>
-    <dgm:sp3d/>
-    <dgm:txPr/>
-    <dgm:style>
-      <a:lnRef idx="1">
-        <a:scrgbClr r="0" g="0" b="0"/>
-      </a:lnRef>
-      <a:fillRef idx="1">
-        <a:scrgbClr r="0" g="0" b="0"/>
-      </a:fillRef>
-      <a:effectRef idx="0">
-        <a:scrgbClr r="0" g="0" b="0"/>
-      </a:effectRef>
-      <a:fontRef idx="minor"/>
-    </dgm:style>
-  </dgm:styleLbl>
-  <dgm:styleLbl name="trAlignAcc1">
-    <dgm:scene3d>
-      <a:camera prst="orthographicFront"/>
-      <a:lightRig rig="threePt" dir="t"/>
-    </dgm:scene3d>
-    <dgm:sp3d/>
-    <dgm:txPr/>
-    <dgm:style>
-      <a:lnRef idx="1">
-        <a:scrgbClr r="0" g="0" b="0"/>
-      </a:lnRef>
-      <a:fillRef idx="1">
-        <a:scrgbClr r="0" g="0" b="0"/>
-      </a:fillRef>
-      <a:effectRef idx="0">
-        <a:scrgbClr r="0" g="0" b="0"/>
-      </a:effectRef>
-      <a:fontRef idx="minor"/>
-    </dgm:style>
-  </dgm:styleLbl>
-  <dgm:styleLbl name="bgAcc1">
-    <dgm:scene3d>
-      <a:camera prst="orthographicFront"/>
-      <a:lightRig rig="threePt" dir="t"/>
-    </dgm:scene3d>
-    <dgm:sp3d/>
-    <dgm:txPr/>
-    <dgm:style>
-      <a:lnRef idx="1">
-        <a:scrgbClr r="0" g="0" b="0"/>
-      </a:lnRef>
-      <a:fillRef idx="1">
-        <a:scrgbClr r="0" g="0" b="0"/>
-      </a:fillRef>
-      <a:effectRef idx="0">
-        <a:scrgbClr r="0" g="0" b="0"/>
-      </a:effectRef>
-      <a:fontRef idx="minor"/>
-    </dgm:style>
-  </dgm:styleLbl>
-  <dgm:styleLbl name="solidFgAcc1">
-    <dgm:scene3d>
-      <a:camera prst="orthographicFront"/>
-      <a:lightRig rig="threePt" dir="t"/>
-    </dgm:scene3d>
-    <dgm:sp3d/>
-    <dgm:txPr/>
-    <dgm:style>
-      <a:lnRef idx="1">
-        <a:scrgbClr r="0" g="0" b="0"/>
-      </a:lnRef>
-      <a:fillRef idx="1">
-        <a:scrgbClr r="0" g="0" b="0"/>
-      </a:fillRef>
-      <a:effectRef idx="0">
-        <a:scrgbClr r="0" g="0" b="0"/>
-      </a:effectRef>
-      <a:fontRef idx="minor"/>
-    </dgm:style>
-  </dgm:styleLbl>
-  <dgm:styleLbl name="solidAlignAcc1">
-    <dgm:scene3d>
-      <a:camera prst="orthographicFront"/>
-      <a:lightRig rig="threePt" dir="t"/>
-    </dgm:scene3d>
-    <dgm:sp3d/>
-    <dgm:txPr/>
-    <dgm:style>
-      <a:lnRef idx="1">
-        <a:scrgbClr r="0" g="0" b="0"/>
-      </a:lnRef>
-      <a:fillRef idx="1">
-        <a:scrgbClr r="0" g="0" b="0"/>
-      </a:fillRef>
-      <a:effectRef idx="0">
-        <a:scrgbClr r="0" g="0" b="0"/>
-      </a:effectRef>
-      <a:fontRef idx="minor"/>
-    </dgm:style>
-  </dgm:styleLbl>
-  <dgm:styleLbl name="solidBgAcc1">
-    <dgm:scene3d>
-      <a:camera prst="orthographicFront"/>
-      <a:lightRig rig="threePt" dir="t"/>
-    </dgm:scene3d>
-    <dgm:sp3d/>
-    <dgm:txPr/>
-    <dgm:style>
-      <a:lnRef idx="1">
-        <a:scrgbClr r="0" g="0" b="0"/>
-      </a:lnRef>
-      <a:fillRef idx="1">
-        <a:scrgbClr r="0" g="0" b="0"/>
-      </a:fillRef>
-      <a:effectRef idx="0">
-        <a:scrgbClr r="0" g="0" b="0"/>
-      </a:effectRef>
-      <a:fontRef idx="minor"/>
-    </dgm:style>
-  </dgm:styleLbl>
-  <dgm:styleLbl name="fgAccFollowNode1">
-    <dgm:scene3d>
-      <a:camera prst="orthographicFront"/>
-      <a:lightRig rig="threePt" dir="t"/>
-    </dgm:scene3d>
-    <dgm:sp3d/>
-    <dgm:txPr/>
-    <dgm:style>
-      <a:lnRef idx="1">
-        <a:scrgbClr r="0" g="0" b="0"/>
-      </a:lnRef>
-      <a:fillRef idx="1">
-        <a:scrgbClr r="0" g="0" b="0"/>
-      </a:fillRef>
-      <a:effectRef idx="0">
-        <a:scrgbClr r="0" g="0" b="0"/>
-      </a:effectRef>
-      <a:fontRef idx="minor"/>
-    </dgm:style>
-  </dgm:styleLbl>
-  <dgm:styleLbl name="alignAccFollowNode1">
-    <dgm:scene3d>
-      <a:camera prst="orthographicFront"/>
-      <a:lightRig rig="threePt" dir="t"/>
-    </dgm:scene3d>
-    <dgm:sp3d/>
-    <dgm:txPr/>
-    <dgm:style>
-      <a:lnRef idx="1">
-        <a:scrgbClr r="0" g="0" b="0"/>
-      </a:lnRef>
-      <a:fillRef idx="1">
-        <a:scrgbClr r="0" g="0" b="0"/>
-      </a:fillRef>
-      <a:effectRef idx="0">
-        <a:scrgbClr r="0" g="0" b="0"/>
-      </a:effectRef>
-      <a:fontRef idx="minor"/>
-    </dgm:style>
-  </dgm:styleLbl>
-  <dgm:styleLbl name="bgAccFollowNode1">
-    <dgm:scene3d>
-      <a:camera prst="orthographicFront"/>
-      <a:lightRig rig="threePt" dir="t"/>
-    </dgm:scene3d>
-    <dgm:sp3d/>
-    <dgm:txPr/>
-    <dgm:style>
-      <a:lnRef idx="1">
-        <a:scrgbClr r="0" g="0" b="0"/>
-      </a:lnRef>
-      <a:fillRef idx="1">
-        <a:scrgbClr r="0" g="0" b="0"/>
-      </a:fillRef>
-      <a:effectRef idx="0">
-        <a:scrgbClr r="0" g="0" b="0"/>
-      </a:effectRef>
-      <a:fontRef idx="minor"/>
-    </dgm:style>
-  </dgm:styleLbl>
-  <dgm:styleLbl name="fgAcc0">
-    <dgm:scene3d>
-      <a:camera prst="orthographicFront"/>
-      <a:lightRig rig="threePt" dir="t"/>
-    </dgm:scene3d>
-    <dgm:sp3d/>
-    <dgm:txPr/>
-    <dgm:style>
-      <a:lnRef idx="1">
-        <a:scrgbClr r="0" g="0" b="0"/>
-      </a:lnRef>
-      <a:fillRef idx="1">
-        <a:scrgbClr r="0" g="0" b="0"/>
-      </a:fillRef>
-      <a:effectRef idx="0">
-        <a:scrgbClr r="0" g="0" b="0"/>
-      </a:effectRef>
-      <a:fontRef idx="minor"/>
-    </dgm:style>
-  </dgm:styleLbl>
-  <dgm:styleLbl name="fgAcc2">
-    <dgm:scene3d>
-      <a:camera prst="orthographicFront"/>
-      <a:lightRig rig="threePt" dir="t"/>
-    </dgm:scene3d>
-    <dgm:sp3d/>
-    <dgm:txPr/>
-    <dgm:style>
-      <a:lnRef idx="1">
-        <a:scrgbClr r="0" g="0" b="0"/>
-      </a:lnRef>
-      <a:fillRef idx="1">
-        <a:scrgbClr r="0" g="0" b="0"/>
-      </a:fillRef>
-      <a:effectRef idx="0">
-        <a:scrgbClr r="0" g="0" b="0"/>
-      </a:effectRef>
-      <a:fontRef idx="minor"/>
-    </dgm:style>
-  </dgm:styleLbl>
-  <dgm:styleLbl name="fgAcc3">
-    <dgm:scene3d>
-      <a:camera prst="orthographicFront"/>
-      <a:lightRig rig="threePt" dir="t"/>
-    </dgm:scene3d>
-    <dgm:sp3d/>
-    <dgm:txPr/>
-    <dgm:style>
-      <a:lnRef idx="1">
-        <a:scrgbClr r="0" g="0" b="0"/>
-      </a:lnRef>
-      <a:fillRef idx="1">
-        <a:scrgbClr r="0" g="0" b="0"/>
-      </a:fillRef>
-      <a:effectRef idx="0">
-        <a:scrgbClr r="0" g="0" b="0"/>
-      </a:effectRef>
-      <a:fontRef idx="minor"/>
-    </dgm:style>
-  </dgm:styleLbl>
-  <dgm:styleLbl name="fgAcc4">
-    <dgm:scene3d>
-      <a:camera prst="orthographicFront"/>
-      <a:lightRig rig="threePt" dir="t"/>
-    </dgm:scene3d>
-    <dgm:sp3d/>
-    <dgm:txPr/>
-    <dgm:style>
-      <a:lnRef idx="1">
-        <a:scrgbClr r="0" g="0" b="0"/>
-      </a:lnRef>
-      <a:fillRef idx="1">
-        <a:scrgbClr r="0" g="0" b="0"/>
-      </a:fillRef>
-      <a:effectRef idx="0">
-        <a:scrgbClr r="0" g="0" b="0"/>
-      </a:effectRef>
-      <a:fontRef idx="minor"/>
-    </dgm:style>
-  </dgm:styleLbl>
-  <dgm:styleLbl name="bgShp">
-    <dgm:scene3d>
-      <a:camera prst="orthographicFront"/>
-      <a:lightRig rig="threePt" dir="t"/>
-    </dgm:scene3d>
-    <dgm:sp3d/>
-    <dgm:txPr/>
-    <dgm:style>
-      <a:lnRef idx="0">
-        <a:scrgbClr r="0" g="0" b="0"/>
-      </a:lnRef>
-      <a:fillRef idx="1">
-        <a:scrgbClr r="0" g="0" b="0"/>
-      </a:fillRef>
-      <a:effectRef idx="2">
-        <a:scrgbClr r="0" g="0" b="0"/>
-      </a:effectRef>
-      <a:fontRef idx="minor"/>
-    </dgm:style>
-  </dgm:styleLbl>
-  <dgm:styleLbl name="dkBgShp">
-    <dgm:scene3d>
-      <a:camera prst="orthographicFront"/>
-      <a:lightRig rig="threePt" dir="t"/>
-    </dgm:scene3d>
-    <dgm:sp3d/>
-    <dgm:txPr/>
-    <dgm:style>
-      <a:lnRef idx="0">
-        <a:scrgbClr r="0" g="0" b="0"/>
-      </a:lnRef>
-      <a:fillRef idx="1">
-        <a:scrgbClr r="0" g="0" b="0"/>
-      </a:fillRef>
-      <a:effectRef idx="2">
-        <a:scrgbClr r="0" g="0" b="0"/>
-      </a:effectRef>
-      <a:fontRef idx="minor"/>
-    </dgm:style>
-  </dgm:styleLbl>
-  <dgm:styleLbl name="trBgShp">
-    <dgm:scene3d>
-      <a:camera prst="orthographicFront"/>
-      <a:lightRig rig="threePt" dir="t"/>
-    </dgm:scene3d>
-    <dgm:sp3d/>
-    <dgm:txPr/>
-    <dgm:style>
-      <a:lnRef idx="0">
-        <a:scrgbClr r="0" g="0" b="0"/>
-      </a:lnRef>
-      <a:fillRef idx="1">
-        <a:scrgbClr r="0" g="0" b="0"/>
-      </a:fillRef>
-      <a:effectRef idx="0">
-        <a:scrgbClr r="0" g="0" b="0"/>
-      </a:effectRef>
-      <a:fontRef idx="minor"/>
-    </dgm:style>
-  </dgm:styleLbl>
-  <dgm:styleLbl name="fgShp">
-    <dgm:scene3d>
-      <a:camera prst="orthographicFront"/>
-      <a:lightRig rig="threePt" dir="t"/>
-    </dgm:scene3d>
-    <dgm:sp3d/>
-    <dgm:txPr/>
-    <dgm:style>
-      <a:lnRef idx="0">
-        <a:scrgbClr r="0" g="0" b="0"/>
-      </a:lnRef>
-      <a:fillRef idx="3">
-        <a:scrgbClr r="0" g="0" b="0"/>
-      </a:fillRef>
-      <a:effectRef idx="2">
-        <a:scrgbClr r="0" g="0" b="0"/>
-      </a:effectRef>
-      <a:fontRef idx="minor"/>
-    </dgm:style>
-  </dgm:styleLbl>
-  <dgm:styleLbl name="revTx">
-    <dgm:scene3d>
-      <a:camera prst="orthographicFront"/>
-      <a:lightRig rig="threePt" dir="t"/>
-    </dgm:scene3d>
-    <dgm:sp3d/>
-    <dgm:txPr/>
-    <dgm:style>
-      <a:lnRef idx="0">
-        <a:scrgbClr r="0" g="0" b="0"/>
-      </a:lnRef>
-      <a:fillRef idx="0">
-        <a:scrgbClr r="0" g="0" b="0"/>
-      </a:fillRef>
-      <a:effectRef idx="0">
-        <a:scrgbClr r="0" g="0" b="0"/>
-      </a:effectRef>
-      <a:fontRef idx="minor"/>
-    </dgm:style>
-  </dgm:styleLbl>
-</dgm:styleDef>
 </file>
 
 <file path=ppt/slideLayouts/slideLayout1.xml><?xml version="1.0" encoding="utf-8"?>
@@ -9447,28 +6083,6 @@
 <file path=ppt/slides/slide10.xml><?xml version="1.0" encoding="utf-8"?>
 <p:sld xmlns:a="http://schemas.openxmlformats.org/drawingml/2006/main" xmlns:r="http://schemas.openxmlformats.org/officeDocument/2006/relationships" xmlns:p="http://schemas.openxmlformats.org/presentationml/2006/main">
   <p:cSld>
-    <p:bg>
-      <p:bgPr>
-        <a:blipFill rotWithShape="1">
-          <a:blip r:embed="rId2">
-            <a:duotone>
-              <a:schemeClr val="bg2">
-                <a:shade val="18000"/>
-                <a:satMod val="160000"/>
-                <a:lumMod val="28000"/>
-              </a:schemeClr>
-              <a:schemeClr val="bg2">
-                <a:tint val="95000"/>
-                <a:satMod val="160000"/>
-                <a:lumMod val="116000"/>
-              </a:schemeClr>
-            </a:duotone>
-          </a:blip>
-          <a:stretch/>
-        </a:blipFill>
-        <a:effectLst/>
-      </p:bgPr>
-    </p:bg>
     <p:spTree>
       <p:nvGrpSpPr>
         <p:cNvPr id="1" name=""/>
@@ -9488,7 +6102,7 @@
           <p:cNvPr id="2" name="Title 1">
             <a:extLst>
               <a:ext uri="{FF2B5EF4-FFF2-40B4-BE49-F238E27FC236}">
-                <a16:creationId xmlns:a16="http://schemas.microsoft.com/office/drawing/2014/main" id="{3C666843-560A-8904-C2F7-03A0AABB856F}"/>
+                <a16:creationId xmlns:a16="http://schemas.microsoft.com/office/drawing/2014/main" id="{1588D826-4CA2-E6FE-8B3E-033865BBBC74}"/>
               </a:ext>
             </a:extLst>
           </p:cNvPr>
@@ -9499,57 +6113,58 @@
             <p:ph type="title"/>
           </p:nvPr>
         </p:nvSpPr>
-        <p:spPr>
-          <a:xfrm>
-            <a:off x="752475" y="609600"/>
-            <a:ext cx="3643150" cy="5603310"/>
-          </a:xfrm>
-        </p:spPr>
-        <p:txBody>
-          <a:bodyPr vert="horz" lIns="91440" tIns="45720" rIns="91440" bIns="45720" rtlCol="0" anchor="ctr">
-            <a:normAutofit/>
-          </a:bodyPr>
-          <a:lstStyle/>
-          <a:p>
-            <a:r>
-              <a:rPr lang="en-US" sz="2800" dirty="0"/>
-              <a:t>Security Features</a:t>
-            </a:r>
-          </a:p>
-        </p:txBody>
-      </p:sp>
-      <p:graphicFrame>
-        <p:nvGraphicFramePr>
-          <p:cNvPr id="7" name="Text Placeholder 2">
+        <p:spPr/>
+        <p:txBody>
+          <a:bodyPr/>
+          <a:lstStyle/>
+          <a:p>
+            <a:r>
+              <a:rPr lang="en-IN" dirty="0"/>
+              <a:t>PROJECT MANAGEMENT</a:t>
+            </a:r>
+            <a:br>
+              <a:rPr lang="en-IN" dirty="0"/>
+            </a:br>
+            <a:r>
+              <a:rPr lang="en-IN" sz="2400" dirty="0"/>
+              <a:t>(GITHUB COLLABORATION)</a:t>
+            </a:r>
+          </a:p>
+        </p:txBody>
+      </p:sp>
+      <p:pic>
+        <p:nvPicPr>
+          <p:cNvPr id="5" name="Content Placeholder 4">
             <a:extLst>
               <a:ext uri="{FF2B5EF4-FFF2-40B4-BE49-F238E27FC236}">
-                <a16:creationId xmlns:a16="http://schemas.microsoft.com/office/drawing/2014/main" id="{8DDA153E-F027-15F5-2356-1D9371F3A4F9}"/>
+                <a16:creationId xmlns:a16="http://schemas.microsoft.com/office/drawing/2014/main" id="{72E82A5C-2FB0-864F-FF55-853BA2B22E4C}"/>
               </a:ext>
             </a:extLst>
           </p:cNvPr>
-          <p:cNvGraphicFramePr/>
-          <p:nvPr>
-            <p:extLst>
-              <p:ext uri="{D42A27DB-BD31-4B8C-83A1-F6EECF244321}">
-                <p14:modId xmlns:p14="http://schemas.microsoft.com/office/powerpoint/2010/main" val="2571211659"/>
-              </p:ext>
-            </p:extLst>
-          </p:nvPr>
-        </p:nvGraphicFramePr>
-        <p:xfrm>
-          <a:off x="5127625" y="1114425"/>
-          <a:ext cx="5924550" cy="4629150"/>
-        </p:xfrm>
-        <a:graphic>
-          <a:graphicData uri="http://schemas.openxmlformats.org/drawingml/2006/diagram">
-            <dgm:relIds xmlns:dgm="http://schemas.openxmlformats.org/drawingml/2006/diagram" xmlns:r="http://schemas.openxmlformats.org/officeDocument/2006/relationships" r:dm="rId3" r:lo="rId4" r:qs="rId5" r:cs="rId6"/>
-          </a:graphicData>
-        </a:graphic>
-      </p:graphicFrame>
+          <p:cNvPicPr>
+            <a:picLocks noGrp="1" noChangeAspect="1"/>
+          </p:cNvPicPr>
+          <p:nvPr>
+            <p:ph idx="1"/>
+          </p:nvPr>
+        </p:nvPicPr>
+        <p:blipFill>
+          <a:blip r:embed="rId2"/>
+          <a:stretch>
+            <a:fillRect/>
+          </a:stretch>
+        </p:blipFill>
+        <p:spPr>
+          <a:xfrm>
+            <a:off x="2642917" y="2095500"/>
+            <a:ext cx="6906166" cy="4536528"/>
+          </a:xfrm>
+        </p:spPr>
+      </p:pic>
     </p:spTree>
     <p:extLst>
       <p:ext uri="{BB962C8B-B14F-4D97-AF65-F5344CB8AC3E}">
-        <p14:creationId xmlns:p14="http://schemas.microsoft.com/office/powerpoint/2010/main" val="510892762"/>
+        <p14:creationId xmlns:p14="http://schemas.microsoft.com/office/powerpoint/2010/main" val="3002255265"/>
       </p:ext>
     </p:extLst>
   </p:cSld>
@@ -9581,100 +6196,6 @@
           <p:cNvPr id="2" name="Title 1">
             <a:extLst>
               <a:ext uri="{FF2B5EF4-FFF2-40B4-BE49-F238E27FC236}">
-                <a16:creationId xmlns:a16="http://schemas.microsoft.com/office/drawing/2014/main" id="{1588D826-4CA2-E6FE-8B3E-033865BBBC74}"/>
-              </a:ext>
-            </a:extLst>
-          </p:cNvPr>
-          <p:cNvSpPr>
-            <a:spLocks noGrp="1"/>
-          </p:cNvSpPr>
-          <p:nvPr>
-            <p:ph type="title"/>
-          </p:nvPr>
-        </p:nvSpPr>
-        <p:spPr/>
-        <p:txBody>
-          <a:bodyPr/>
-          <a:lstStyle/>
-          <a:p>
-            <a:r>
-              <a:rPr lang="en-IN" dirty="0"/>
-              <a:t>PROJECT MANAGEMENT</a:t>
-            </a:r>
-            <a:br>
-              <a:rPr lang="en-IN" dirty="0"/>
-            </a:br>
-            <a:r>
-              <a:rPr lang="en-IN" sz="2400" dirty="0"/>
-              <a:t>(GITHUB COLLABORATION)</a:t>
-            </a:r>
-          </a:p>
-        </p:txBody>
-      </p:sp>
-      <p:pic>
-        <p:nvPicPr>
-          <p:cNvPr id="5" name="Content Placeholder 4">
-            <a:extLst>
-              <a:ext uri="{FF2B5EF4-FFF2-40B4-BE49-F238E27FC236}">
-                <a16:creationId xmlns:a16="http://schemas.microsoft.com/office/drawing/2014/main" id="{72E82A5C-2FB0-864F-FF55-853BA2B22E4C}"/>
-              </a:ext>
-            </a:extLst>
-          </p:cNvPr>
-          <p:cNvPicPr>
-            <a:picLocks noGrp="1" noChangeAspect="1"/>
-          </p:cNvPicPr>
-          <p:nvPr>
-            <p:ph idx="1"/>
-          </p:nvPr>
-        </p:nvPicPr>
-        <p:blipFill>
-          <a:blip r:embed="rId2"/>
-          <a:stretch>
-            <a:fillRect/>
-          </a:stretch>
-        </p:blipFill>
-        <p:spPr>
-          <a:xfrm>
-            <a:off x="2642917" y="2095500"/>
-            <a:ext cx="6906166" cy="4536528"/>
-          </a:xfrm>
-        </p:spPr>
-      </p:pic>
-    </p:spTree>
-    <p:extLst>
-      <p:ext uri="{BB962C8B-B14F-4D97-AF65-F5344CB8AC3E}">
-        <p14:creationId xmlns:p14="http://schemas.microsoft.com/office/powerpoint/2010/main" val="3002255265"/>
-      </p:ext>
-    </p:extLst>
-  </p:cSld>
-  <p:clrMapOvr>
-    <a:masterClrMapping/>
-  </p:clrMapOvr>
-</p:sld>
-</file>
-
-<file path=ppt/slides/slide12.xml><?xml version="1.0" encoding="utf-8"?>
-<p:sld xmlns:a="http://schemas.openxmlformats.org/drawingml/2006/main" xmlns:r="http://schemas.openxmlformats.org/officeDocument/2006/relationships" xmlns:p="http://schemas.openxmlformats.org/presentationml/2006/main">
-  <p:cSld>
-    <p:spTree>
-      <p:nvGrpSpPr>
-        <p:cNvPr id="1" name=""/>
-        <p:cNvGrpSpPr/>
-        <p:nvPr/>
-      </p:nvGrpSpPr>
-      <p:grpSpPr>
-        <a:xfrm>
-          <a:off x="0" y="0"/>
-          <a:ext cx="0" cy="0"/>
-          <a:chOff x="0" y="0"/>
-          <a:chExt cx="0" cy="0"/>
-        </a:xfrm>
-      </p:grpSpPr>
-      <p:sp>
-        <p:nvSpPr>
-          <p:cNvPr id="2" name="Title 1">
-            <a:extLst>
-              <a:ext uri="{FF2B5EF4-FFF2-40B4-BE49-F238E27FC236}">
                 <a16:creationId xmlns:a16="http://schemas.microsoft.com/office/drawing/2014/main" id="{FF506265-9064-214A-F105-327ACD73A95E}"/>
               </a:ext>
             </a:extLst>
@@ -9749,7 +6270,7 @@
 </p:sld>
 </file>
 
-<file path=ppt/slides/slide13.xml><?xml version="1.0" encoding="utf-8"?>
+<file path=ppt/slides/slide12.xml><?xml version="1.0" encoding="utf-8"?>
 <p:sld xmlns:a="http://schemas.openxmlformats.org/drawingml/2006/main" xmlns:r="http://schemas.openxmlformats.org/officeDocument/2006/relationships" xmlns:p="http://schemas.openxmlformats.org/presentationml/2006/main">
   <p:cSld>
     <p:spTree>

</xml_diff>